<commit_message>
More info in ppt
</commit_message>
<xml_diff>
--- a/docs/Prezentacja Bajguz Kierzkowski.pptx
+++ b/docs/Prezentacja Bajguz Kierzkowski.pptx
@@ -214,7 +214,7 @@
           <a:p>
             <a:fld id="{1ECD208D-F206-4DE1-A130-CB2F44406222}" type="datetimeFigureOut">
               <a:rPr lang="pl-PL" smtClean="0"/>
-              <a:t>2020-06-17</a:t>
+              <a:t>2020-06-18</a:t>
             </a:fld>
             <a:endParaRPr lang="pl-PL"/>
           </a:p>
@@ -964,7 +964,7 @@
           <a:p>
             <a:fld id="{D212F793-D17A-417E-9250-C2A1FC8F817D}" type="datetime1">
               <a:rPr lang="en-US" smtClean="0"/>
-              <a:t>6/17/2020</a:t>
+              <a:t>6/18/2020</a:t>
             </a:fld>
             <a:endParaRPr lang="en-US"/>
           </a:p>
@@ -1215,7 +1215,7 @@
           <a:p>
             <a:fld id="{ECBC202B-11B5-48B7-B7F0-13C83584BDA8}" type="datetime1">
               <a:rPr lang="en-US" smtClean="0"/>
-              <a:t>6/17/2020</a:t>
+              <a:t>6/18/2020</a:t>
             </a:fld>
             <a:endParaRPr lang="en-US"/>
           </a:p>
@@ -1476,7 +1476,7 @@
           <a:p>
             <a:fld id="{D8684B86-FE16-4328-945A-B8A64E5F8641}" type="datetime1">
               <a:rPr lang="en-US" smtClean="0"/>
-              <a:t>6/17/2020</a:t>
+              <a:t>6/18/2020</a:t>
             </a:fld>
             <a:endParaRPr lang="en-US"/>
           </a:p>
@@ -1727,7 +1727,7 @@
           <a:p>
             <a:fld id="{6A68DCFA-D0AD-4FE1-BDE8-DDED694D5B3C}" type="datetime1">
               <a:rPr lang="en-US" smtClean="0"/>
-              <a:t>6/17/2020</a:t>
+              <a:t>6/18/2020</a:t>
             </a:fld>
             <a:endParaRPr lang="en-US"/>
           </a:p>
@@ -2055,7 +2055,7 @@
           <a:p>
             <a:fld id="{D0BC7A0A-7D3C-4FF4-A761-8E59D07697D7}" type="datetime1">
               <a:rPr lang="en-US" smtClean="0"/>
-              <a:t>6/17/2020</a:t>
+              <a:t>6/18/2020</a:t>
             </a:fld>
             <a:endParaRPr lang="en-US"/>
           </a:p>
@@ -2373,7 +2373,7 @@
           <a:p>
             <a:fld id="{421721B3-5F61-4EB4-9477-E06D99717A8A}" type="datetime1">
               <a:rPr lang="en-US" smtClean="0"/>
-              <a:t>6/17/2020</a:t>
+              <a:t>6/18/2020</a:t>
             </a:fld>
             <a:endParaRPr lang="en-US"/>
           </a:p>
@@ -2838,7 +2838,7 @@
           <a:p>
             <a:fld id="{530ED192-0826-4863-86AC-E82176F50861}" type="datetime1">
               <a:rPr lang="en-US" smtClean="0"/>
-              <a:t>6/17/2020</a:t>
+              <a:t>6/18/2020</a:t>
             </a:fld>
             <a:endParaRPr lang="en-US"/>
           </a:p>
@@ -3032,7 +3032,7 @@
           <a:p>
             <a:fld id="{619D96CE-55CD-4CE3-9263-40C1FCA958F0}" type="datetime1">
               <a:rPr lang="en-US" smtClean="0"/>
-              <a:t>6/17/2020</a:t>
+              <a:t>6/18/2020</a:t>
             </a:fld>
             <a:endParaRPr lang="en-US"/>
           </a:p>
@@ -3198,7 +3198,7 @@
           <a:p>
             <a:fld id="{82DA0F9D-89DE-40CF-A809-DD76762E33E7}" type="datetime1">
               <a:rPr lang="en-US" smtClean="0"/>
-              <a:t>6/17/2020</a:t>
+              <a:t>6/18/2020</a:t>
             </a:fld>
             <a:endParaRPr lang="en-US"/>
           </a:p>
@@ -3562,7 +3562,7 @@
           <a:p>
             <a:fld id="{EBD11123-D128-4BC3-B119-DF679DA2D290}" type="datetime1">
               <a:rPr lang="en-US" smtClean="0"/>
-              <a:t>6/17/2020</a:t>
+              <a:t>6/18/2020</a:t>
             </a:fld>
             <a:endParaRPr lang="en-US"/>
           </a:p>
@@ -3906,7 +3906,7 @@
           <a:p>
             <a:fld id="{1C1DC363-5D93-4C75-9D7B-C98F5CAB13EA}" type="datetime1">
               <a:rPr lang="en-US" smtClean="0"/>
-              <a:t>6/17/2020</a:t>
+              <a:t>6/18/2020</a:t>
             </a:fld>
             <a:endParaRPr lang="en-US"/>
           </a:p>
@@ -4200,7 +4200,7 @@
           <a:p>
             <a:fld id="{76A81BAB-9DAE-4BB9-8C1B-9E2E92BBFFD9}" type="datetime1">
               <a:rPr lang="en-US" smtClean="0"/>
-              <a:t>6/17/2020</a:t>
+              <a:t>6/18/2020</a:t>
             </a:fld>
             <a:endParaRPr lang="en-US" dirty="0"/>
           </a:p>
@@ -5024,7 +5024,13 @@
               </a:lnSpc>
               <a:buNone/>
             </a:pPr>
-            <a:endParaRPr lang="pl-PL" dirty="0"/>
+            <a:endParaRPr lang="pl-PL" dirty="0">
+              <a:solidFill>
+                <a:schemeClr val="accent3">
+                  <a:lumMod val="50000"/>
+                </a:schemeClr>
+              </a:solidFill>
+            </a:endParaRPr>
           </a:p>
           <a:p>
             <a:pPr marL="0" indent="0">
@@ -5036,10 +5042,12 @@
             <a:r>
               <a:rPr lang="pl-PL" b="1" dirty="0">
                 <a:solidFill>
-                  <a:srgbClr val="7030A0"/>
+                  <a:schemeClr val="accent3">
+                    <a:lumMod val="50000"/>
+                  </a:schemeClr>
                 </a:solidFill>
               </a:rPr>
-              <a:t>System rozszerzono o trzy funkcjonalności opierające się o nierelacyjnych baz danych:</a:t>
+              <a:t>System rozszerzono o trzy funkcjonalności opierające się na nierelacyjnych baz danych:</a:t>
             </a:r>
           </a:p>
           <a:p>
@@ -5053,7 +5061,9 @@
             <a:r>
               <a:rPr lang="pl-PL" dirty="0">
                 <a:solidFill>
-                  <a:srgbClr val="7030A0"/>
+                  <a:schemeClr val="accent3">
+                    <a:lumMod val="50000"/>
+                  </a:schemeClr>
                 </a:solidFill>
               </a:rPr>
               <a:t> </a:t>
@@ -5061,7 +5071,9 @@
             <a:r>
               <a:rPr lang="pl-PL" dirty="0" err="1">
                 <a:solidFill>
-                  <a:srgbClr val="7030A0"/>
+                  <a:schemeClr val="accent3">
+                    <a:lumMod val="50000"/>
+                  </a:schemeClr>
                 </a:solidFill>
               </a:rPr>
               <a:t>logger</a:t>
@@ -5069,7 +5081,9 @@
             <a:r>
               <a:rPr lang="pl-PL" dirty="0">
                 <a:solidFill>
-                  <a:srgbClr val="7030A0"/>
+                  <a:schemeClr val="accent3">
+                    <a:lumMod val="50000"/>
+                  </a:schemeClr>
                 </a:solidFill>
               </a:rPr>
               <a:t> pociągu (</a:t>
@@ -5077,7 +5091,9 @@
             <a:r>
               <a:rPr lang="pl-PL" dirty="0" err="1">
                 <a:solidFill>
-                  <a:srgbClr val="7030A0"/>
+                  <a:schemeClr val="accent3">
+                    <a:lumMod val="50000"/>
+                  </a:schemeClr>
                 </a:solidFill>
               </a:rPr>
               <a:t>MongoDb</a:t>
@@ -5085,7 +5101,9 @@
             <a:r>
               <a:rPr lang="pl-PL" dirty="0">
                 <a:solidFill>
-                  <a:srgbClr val="7030A0"/>
+                  <a:schemeClr val="accent3">
+                    <a:lumMod val="50000"/>
+                  </a:schemeClr>
                 </a:solidFill>
               </a:rPr>
               <a:t>),</a:t>
@@ -5102,7 +5120,9 @@
             <a:r>
               <a:rPr lang="pl-PL" dirty="0">
                 <a:solidFill>
-                  <a:srgbClr val="7030A0"/>
+                  <a:schemeClr val="accent3">
+                    <a:lumMod val="50000"/>
+                  </a:schemeClr>
                 </a:solidFill>
               </a:rPr>
               <a:t> analityka (</a:t>
@@ -5110,7 +5130,9 @@
             <a:r>
               <a:rPr lang="pl-PL" dirty="0" err="1">
                 <a:solidFill>
-                  <a:srgbClr val="7030A0"/>
+                  <a:schemeClr val="accent3">
+                    <a:lumMod val="50000"/>
+                  </a:schemeClr>
                 </a:solidFill>
               </a:rPr>
               <a:t>MongoDb</a:t>
@@ -5118,7 +5140,9 @@
             <a:r>
               <a:rPr lang="pl-PL" dirty="0">
                 <a:solidFill>
-                  <a:srgbClr val="7030A0"/>
+                  <a:schemeClr val="accent3">
+                    <a:lumMod val="50000"/>
+                  </a:schemeClr>
                 </a:solidFill>
               </a:rPr>
               <a:t>),</a:t>
@@ -5135,10 +5159,12 @@
             <a:r>
               <a:rPr lang="pl-PL" dirty="0">
                 <a:solidFill>
-                  <a:srgbClr val="7030A0"/>
+                  <a:schemeClr val="accent3">
+                    <a:lumMod val="50000"/>
+                  </a:schemeClr>
                 </a:solidFill>
               </a:rPr>
-              <a:t> cache (baza klucz wartość)</a:t>
+              <a:t> cache (baza klucz-wartość)</a:t>
             </a:r>
           </a:p>
           <a:p>
@@ -5514,7 +5540,7 @@
         <p:spPr>
           <a:xfrm>
             <a:off x="838200" y="-1519"/>
-            <a:ext cx="10515600" cy="1164839"/>
+            <a:ext cx="10515600" cy="861391"/>
           </a:xfrm>
         </p:spPr>
         <p:txBody>
@@ -5542,7 +5568,7 @@
         </p:nvSpPr>
         <p:spPr>
           <a:xfrm>
-            <a:off x="749347" y="6065520"/>
+            <a:off x="749347" y="5809662"/>
             <a:ext cx="4414991" cy="530915"/>
           </a:xfrm>
           <a:prstGeom prst="rect">
@@ -5655,7 +5681,7 @@
         </p:nvSpPr>
         <p:spPr>
           <a:xfrm>
-            <a:off x="7736897" y="6283826"/>
+            <a:off x="7736897" y="6250273"/>
             <a:ext cx="2454518" cy="369332"/>
           </a:xfrm>
           <a:prstGeom prst="rect">
@@ -5741,7 +5767,7 @@
         </p:blipFill>
         <p:spPr>
           <a:xfrm>
-            <a:off x="7309414" y="4742375"/>
+            <a:off x="7309414" y="4700435"/>
             <a:ext cx="3309484" cy="1545658"/>
           </a:xfrm>
           <a:prstGeom prst="rect">
@@ -5771,7 +5797,7 @@
         </p:blipFill>
         <p:spPr>
           <a:xfrm>
-            <a:off x="1292490" y="1097280"/>
+            <a:off x="1292490" y="841422"/>
             <a:ext cx="3328706" cy="4998720"/>
           </a:xfrm>
           <a:prstGeom prst="rect">
@@ -5789,13 +5815,13 @@
             </a:extLst>
           </p:cNvPr>
           <p:cNvCxnSpPr>
-            <a:stCxn id="19" idx="3"/>
+            <a:cxnSpLocks/>
           </p:cNvCxnSpPr>
           <p:nvPr/>
         </p:nvCxnSpPr>
         <p:spPr>
           <a:xfrm flipV="1">
-            <a:off x="4621196" y="2321560"/>
+            <a:off x="4621196" y="2308978"/>
             <a:ext cx="2099644" cy="1275080"/>
           </a:xfrm>
           <a:prstGeom prst="bentConnector3">
@@ -5840,11 +5866,11 @@
         <p:spPr>
           <a:xfrm>
             <a:off x="4621196" y="3717925"/>
-            <a:ext cx="2626271" cy="1937808"/>
+            <a:ext cx="2643670" cy="1873337"/>
           </a:xfrm>
           <a:prstGeom prst="bentConnector3">
             <a:avLst>
-              <a:gd name="adj1" fmla="val 59188"/>
+              <a:gd name="adj1" fmla="val 59044"/>
             </a:avLst>
           </a:prstGeom>
           <a:ln>
@@ -5902,6 +5928,369 @@
           </a:ln>
         </p:spPr>
       </p:pic>
+      <p:sp>
+        <p:nvSpPr>
+          <p:cNvPr id="2" name="Prostokąt 1">
+            <a:extLst>
+              <a:ext uri="{FF2B5EF4-FFF2-40B4-BE49-F238E27FC236}">
+                <a16:creationId xmlns:a16="http://schemas.microsoft.com/office/drawing/2014/main" id="{6DB6BA7F-5AA6-468D-B1B9-A1FFFBBE80F0}"/>
+              </a:ext>
+            </a:extLst>
+          </p:cNvPr>
+          <p:cNvSpPr/>
+          <p:nvPr/>
+        </p:nvSpPr>
+        <p:spPr>
+          <a:xfrm>
+            <a:off x="778778" y="6421906"/>
+            <a:ext cx="4385559" cy="261610"/>
+          </a:xfrm>
+          <a:prstGeom prst="rect">
+            <a:avLst/>
+          </a:prstGeom>
+        </p:spPr>
+        <p:txBody>
+          <a:bodyPr wrap="square">
+            <a:spAutoFit/>
+          </a:bodyPr>
+          <a:lstStyle/>
+          <a:p>
+            <a:pPr algn="ctr"/>
+            <a:r>
+              <a:rPr lang="pl-PL" sz="1100" b="1" dirty="0"/>
+              <a:t>Linie kodu: </a:t>
+            </a:r>
+            <a:r>
+              <a:rPr lang="pl-PL" sz="1100" dirty="0"/>
+              <a:t>4749 </a:t>
+            </a:r>
+            <a:r>
+              <a:rPr lang="pl-PL" sz="1100" b="1" dirty="0">
+                <a:solidFill>
+                  <a:schemeClr val="accent6">
+                    <a:lumMod val="50000"/>
+                  </a:schemeClr>
+                </a:solidFill>
+                <a:latin typeface="Calibri" panose="020F0502020204030204" pitchFamily="34" charset="0"/>
+                <a:cs typeface="Calibri" panose="020F0502020204030204" pitchFamily="34" charset="0"/>
+              </a:rPr>
+              <a:t>→</a:t>
+            </a:r>
+            <a:r>
+              <a:rPr lang="pl-PL" sz="1100" b="1" dirty="0">
+                <a:solidFill>
+                  <a:schemeClr val="accent6">
+                    <a:lumMod val="50000"/>
+                  </a:schemeClr>
+                </a:solidFill>
+              </a:rPr>
+              <a:t> 7456 </a:t>
+            </a:r>
+            <a:r>
+              <a:rPr lang="pl-PL" sz="1100" b="1" dirty="0"/>
+              <a:t>| Klasy: </a:t>
+            </a:r>
+            <a:r>
+              <a:rPr lang="pl-PL" sz="1100" dirty="0"/>
+              <a:t>214 </a:t>
+            </a:r>
+            <a:r>
+              <a:rPr lang="pl-PL" sz="1100" b="1" dirty="0">
+                <a:solidFill>
+                  <a:schemeClr val="accent6">
+                    <a:lumMod val="50000"/>
+                  </a:schemeClr>
+                </a:solidFill>
+                <a:latin typeface="Calibri" panose="020F0502020204030204" pitchFamily="34" charset="0"/>
+                <a:cs typeface="Calibri" panose="020F0502020204030204" pitchFamily="34" charset="0"/>
+              </a:rPr>
+              <a:t>→</a:t>
+            </a:r>
+            <a:r>
+              <a:rPr lang="pl-PL" sz="1100" b="1" dirty="0">
+                <a:solidFill>
+                  <a:schemeClr val="accent6">
+                    <a:lumMod val="50000"/>
+                  </a:schemeClr>
+                </a:solidFill>
+              </a:rPr>
+              <a:t> 306 </a:t>
+            </a:r>
+            <a:r>
+              <a:rPr lang="pl-PL" sz="1100" b="1" dirty="0"/>
+              <a:t>| Interfejsy: </a:t>
+            </a:r>
+            <a:r>
+              <a:rPr lang="pl-PL" sz="1100" dirty="0"/>
+              <a:t>37 </a:t>
+            </a:r>
+            <a:r>
+              <a:rPr lang="pl-PL" sz="1100" b="1" dirty="0">
+                <a:solidFill>
+                  <a:schemeClr val="accent6">
+                    <a:lumMod val="50000"/>
+                  </a:schemeClr>
+                </a:solidFill>
+                <a:latin typeface="Calibri" panose="020F0502020204030204" pitchFamily="34" charset="0"/>
+                <a:cs typeface="Calibri" panose="020F0502020204030204" pitchFamily="34" charset="0"/>
+              </a:rPr>
+              <a:t>→</a:t>
+            </a:r>
+            <a:r>
+              <a:rPr lang="pl-PL" sz="1100" b="1" dirty="0">
+                <a:solidFill>
+                  <a:schemeClr val="accent6">
+                    <a:lumMod val="50000"/>
+                  </a:schemeClr>
+                </a:solidFill>
+              </a:rPr>
+              <a:t> 57</a:t>
+            </a:r>
+          </a:p>
+        </p:txBody>
+      </p:sp>
+      <p:sp>
+        <p:nvSpPr>
+          <p:cNvPr id="18" name="Prostokąt 17">
+            <a:extLst>
+              <a:ext uri="{FF2B5EF4-FFF2-40B4-BE49-F238E27FC236}">
+                <a16:creationId xmlns:a16="http://schemas.microsoft.com/office/drawing/2014/main" id="{5BD94ED8-31AC-4059-A4F6-2196163B3C08}"/>
+              </a:ext>
+            </a:extLst>
+          </p:cNvPr>
+          <p:cNvSpPr/>
+          <p:nvPr/>
+        </p:nvSpPr>
+        <p:spPr>
+          <a:xfrm>
+            <a:off x="6467339" y="4239233"/>
+            <a:ext cx="5069685" cy="261610"/>
+          </a:xfrm>
+          <a:prstGeom prst="rect">
+            <a:avLst/>
+          </a:prstGeom>
+        </p:spPr>
+        <p:txBody>
+          <a:bodyPr wrap="square">
+            <a:spAutoFit/>
+          </a:bodyPr>
+          <a:lstStyle/>
+          <a:p>
+            <a:pPr algn="ctr"/>
+            <a:r>
+              <a:rPr lang="pl-PL" sz="1100" b="1" dirty="0"/>
+              <a:t>Linie kodu: </a:t>
+            </a:r>
+            <a:r>
+              <a:rPr lang="pl-PL" sz="1100" dirty="0"/>
+              <a:t>0 </a:t>
+            </a:r>
+            <a:r>
+              <a:rPr lang="pl-PL" sz="1100" b="1" dirty="0">
+                <a:solidFill>
+                  <a:schemeClr val="accent5">
+                    <a:lumMod val="75000"/>
+                  </a:schemeClr>
+                </a:solidFill>
+                <a:latin typeface="Calibri" panose="020F0502020204030204" pitchFamily="34" charset="0"/>
+                <a:cs typeface="Calibri" panose="020F0502020204030204" pitchFamily="34" charset="0"/>
+              </a:rPr>
+              <a:t>→</a:t>
+            </a:r>
+            <a:r>
+              <a:rPr lang="pl-PL" sz="1100" b="1" dirty="0">
+                <a:solidFill>
+                  <a:schemeClr val="accent5">
+                    <a:lumMod val="75000"/>
+                  </a:schemeClr>
+                </a:solidFill>
+              </a:rPr>
+              <a:t> 3881 C#; 2123 XAML </a:t>
+            </a:r>
+            <a:r>
+              <a:rPr lang="pl-PL" sz="1100" b="1" dirty="0"/>
+              <a:t>| Klasy: </a:t>
+            </a:r>
+            <a:r>
+              <a:rPr lang="pl-PL" sz="1100" dirty="0"/>
+              <a:t>0 </a:t>
+            </a:r>
+            <a:r>
+              <a:rPr lang="pl-PL" sz="1100" b="1" dirty="0">
+                <a:solidFill>
+                  <a:schemeClr val="accent5">
+                    <a:lumMod val="75000"/>
+                  </a:schemeClr>
+                </a:solidFill>
+                <a:latin typeface="Calibri" panose="020F0502020204030204" pitchFamily="34" charset="0"/>
+                <a:cs typeface="Calibri" panose="020F0502020204030204" pitchFamily="34" charset="0"/>
+              </a:rPr>
+              <a:t>→</a:t>
+            </a:r>
+            <a:r>
+              <a:rPr lang="pl-PL" sz="1100" b="1" dirty="0">
+                <a:solidFill>
+                  <a:schemeClr val="accent5">
+                    <a:lumMod val="75000"/>
+                  </a:schemeClr>
+                </a:solidFill>
+              </a:rPr>
+              <a:t> 168 </a:t>
+            </a:r>
+            <a:r>
+              <a:rPr lang="pl-PL" sz="1100" b="1" dirty="0"/>
+              <a:t>| Interfejsy: </a:t>
+            </a:r>
+            <a:r>
+              <a:rPr lang="pl-PL" sz="1100" dirty="0"/>
+              <a:t>0 </a:t>
+            </a:r>
+            <a:r>
+              <a:rPr lang="pl-PL" sz="1100" b="1" dirty="0">
+                <a:solidFill>
+                  <a:schemeClr val="accent5">
+                    <a:lumMod val="75000"/>
+                  </a:schemeClr>
+                </a:solidFill>
+                <a:latin typeface="Calibri" panose="020F0502020204030204" pitchFamily="34" charset="0"/>
+                <a:cs typeface="Calibri" panose="020F0502020204030204" pitchFamily="34" charset="0"/>
+              </a:rPr>
+              <a:t>→</a:t>
+            </a:r>
+            <a:r>
+              <a:rPr lang="pl-PL" sz="1100" b="1" dirty="0">
+                <a:solidFill>
+                  <a:schemeClr val="accent5">
+                    <a:lumMod val="75000"/>
+                  </a:schemeClr>
+                </a:solidFill>
+              </a:rPr>
+              <a:t> 34</a:t>
+            </a:r>
+          </a:p>
+        </p:txBody>
+      </p:sp>
+      <p:sp>
+        <p:nvSpPr>
+          <p:cNvPr id="20" name="Prostokąt 19">
+            <a:extLst>
+              <a:ext uri="{FF2B5EF4-FFF2-40B4-BE49-F238E27FC236}">
+                <a16:creationId xmlns:a16="http://schemas.microsoft.com/office/drawing/2014/main" id="{8A6383C0-1CF8-4770-BEAB-6F5F9A5892DB}"/>
+              </a:ext>
+            </a:extLst>
+          </p:cNvPr>
+          <p:cNvSpPr/>
+          <p:nvPr/>
+        </p:nvSpPr>
+        <p:spPr>
+          <a:xfrm>
+            <a:off x="6741959" y="6572518"/>
+            <a:ext cx="4385559" cy="261610"/>
+          </a:xfrm>
+          <a:prstGeom prst="rect">
+            <a:avLst/>
+          </a:prstGeom>
+        </p:spPr>
+        <p:txBody>
+          <a:bodyPr wrap="square">
+            <a:spAutoFit/>
+          </a:bodyPr>
+          <a:lstStyle/>
+          <a:p>
+            <a:pPr algn="ctr"/>
+            <a:r>
+              <a:rPr lang="pl-PL" sz="1100" b="1" dirty="0"/>
+              <a:t>Linie kodu: </a:t>
+            </a:r>
+            <a:r>
+              <a:rPr lang="pl-PL" sz="1100" dirty="0"/>
+              <a:t>0 </a:t>
+            </a:r>
+            <a:r>
+              <a:rPr lang="pl-PL" sz="1100" b="1" dirty="0">
+                <a:solidFill>
+                  <a:schemeClr val="accent1">
+                    <a:lumMod val="75000"/>
+                  </a:schemeClr>
+                </a:solidFill>
+                <a:latin typeface="Calibri" panose="020F0502020204030204" pitchFamily="34" charset="0"/>
+                <a:cs typeface="Calibri" panose="020F0502020204030204" pitchFamily="34" charset="0"/>
+              </a:rPr>
+              <a:t>→</a:t>
+            </a:r>
+            <a:r>
+              <a:rPr lang="pl-PL" sz="1100" b="1" dirty="0">
+                <a:solidFill>
+                  <a:schemeClr val="accent1">
+                    <a:lumMod val="75000"/>
+                  </a:schemeClr>
+                </a:solidFill>
+              </a:rPr>
+              <a:t> 816 </a:t>
+            </a:r>
+            <a:r>
+              <a:rPr lang="pl-PL" sz="1100" b="1" dirty="0"/>
+              <a:t>| Klasy: </a:t>
+            </a:r>
+            <a:r>
+              <a:rPr lang="pl-PL" sz="1100" dirty="0"/>
+              <a:t>0 </a:t>
+            </a:r>
+            <a:r>
+              <a:rPr lang="pl-PL" sz="1100" b="1" dirty="0">
+                <a:solidFill>
+                  <a:schemeClr val="accent1">
+                    <a:lumMod val="75000"/>
+                  </a:schemeClr>
+                </a:solidFill>
+                <a:latin typeface="Calibri" panose="020F0502020204030204" pitchFamily="34" charset="0"/>
+                <a:cs typeface="Calibri" panose="020F0502020204030204" pitchFamily="34" charset="0"/>
+              </a:rPr>
+              <a:t>→</a:t>
+            </a:r>
+            <a:r>
+              <a:rPr lang="pl-PL" sz="1100" b="1" dirty="0">
+                <a:solidFill>
+                  <a:schemeClr val="accent1">
+                    <a:lumMod val="75000"/>
+                  </a:schemeClr>
+                </a:solidFill>
+              </a:rPr>
+              <a:t> 48 </a:t>
+            </a:r>
+            <a:r>
+              <a:rPr lang="pl-PL" sz="1100" b="1" dirty="0"/>
+              <a:t>| Interfejsy: </a:t>
+            </a:r>
+            <a:r>
+              <a:rPr lang="pl-PL" sz="1100" dirty="0"/>
+              <a:t>0 </a:t>
+            </a:r>
+            <a:r>
+              <a:rPr lang="pl-PL" sz="1100" b="1" dirty="0">
+                <a:solidFill>
+                  <a:schemeClr val="accent1">
+                    <a:lumMod val="75000"/>
+                  </a:schemeClr>
+                </a:solidFill>
+                <a:latin typeface="Calibri" panose="020F0502020204030204" pitchFamily="34" charset="0"/>
+                <a:cs typeface="Calibri" panose="020F0502020204030204" pitchFamily="34" charset="0"/>
+              </a:rPr>
+              <a:t>→</a:t>
+            </a:r>
+            <a:r>
+              <a:rPr lang="pl-PL" sz="1100" b="1" dirty="0">
+                <a:solidFill>
+                  <a:schemeClr val="accent1">
+                    <a:lumMod val="75000"/>
+                  </a:schemeClr>
+                </a:solidFill>
+              </a:rPr>
+              <a:t> 1</a:t>
+            </a:r>
+          </a:p>
+        </p:txBody>
+      </p:sp>
     </p:spTree>
     <p:extLst>
       <p:ext uri="{BB962C8B-B14F-4D97-AF65-F5344CB8AC3E}">
@@ -6333,6 +6722,11 @@
             </a:pathLst>
           </a:custGeom>
           <a:ln w="28575">
+            <a:solidFill>
+              <a:schemeClr val="accent6">
+                <a:lumMod val="50000"/>
+              </a:schemeClr>
+            </a:solidFill>
             <a:extLst>
               <a:ext uri="{C807C97D-BFC1-408E-A445-0C87EB9F89A2}">
                 <ask:lineSketchStyleProps xmlns:ask="http://schemas.microsoft.com/office/drawing/2018/sketchyshapes" sd="2832065101">
@@ -7056,6 +7450,11 @@
             </a:pathLst>
           </a:custGeom>
           <a:ln w="28575">
+            <a:solidFill>
+              <a:schemeClr val="accent6">
+                <a:lumMod val="50000"/>
+              </a:schemeClr>
+            </a:solidFill>
             <a:extLst>
               <a:ext uri="{C807C97D-BFC1-408E-A445-0C87EB9F89A2}">
                 <ask:lineSketchStyleProps xmlns:ask="http://schemas.microsoft.com/office/drawing/2018/sketchyshapes" sd="1975793617">
@@ -8457,6 +8856,11 @@
             </a:pathLst>
           </a:custGeom>
           <a:ln w="28575">
+            <a:solidFill>
+              <a:schemeClr val="accent3">
+                <a:lumMod val="75000"/>
+              </a:schemeClr>
+            </a:solidFill>
             <a:extLst>
               <a:ext uri="{C807C97D-BFC1-408E-A445-0C87EB9F89A2}">
                 <ask:lineSketchStyleProps xmlns:ask="http://schemas.microsoft.com/office/drawing/2018/sketchyshapes" sd="3788185039">
@@ -8623,7 +9027,7 @@
         </p:blipFill>
         <p:spPr>
           <a:xfrm>
-            <a:off x="8690279" y="1535258"/>
+            <a:off x="8690279" y="2035678"/>
             <a:ext cx="2405525" cy="948814"/>
           </a:xfrm>
           <a:prstGeom prst="rect">
@@ -8660,7 +9064,7 @@
         </p:blipFill>
         <p:spPr bwMode="auto">
           <a:xfrm>
-            <a:off x="8690279" y="2619244"/>
+            <a:off x="8690279" y="2933144"/>
             <a:ext cx="2405525" cy="626167"/>
           </a:xfrm>
           <a:prstGeom prst="rect">
@@ -8852,6 +9256,90 @@
           </a:extLst>
         </p:spPr>
       </p:pic>
+      <p:pic>
+        <p:nvPicPr>
+          <p:cNvPr id="36" name="Picture 6" descr="C_Sharp_logo_web - TechCentral.ie">
+            <a:extLst>
+              <a:ext uri="{FF2B5EF4-FFF2-40B4-BE49-F238E27FC236}">
+                <a16:creationId xmlns:a16="http://schemas.microsoft.com/office/drawing/2014/main" id="{08D144B5-268D-4619-9497-7389F549B27E}"/>
+              </a:ext>
+            </a:extLst>
+          </p:cNvPr>
+          <p:cNvPicPr>
+            <a:picLocks noChangeAspect="1" noChangeArrowheads="1"/>
+          </p:cNvPicPr>
+          <p:nvPr/>
+        </p:nvPicPr>
+        <p:blipFill rotWithShape="1">
+          <a:blip r:embed="rId12">
+            <a:extLst>
+              <a:ext uri="{28A0092B-C50C-407E-A947-70E740481C1C}">
+                <a14:useLocalDpi xmlns:a14="http://schemas.microsoft.com/office/drawing/2010/main" val="0"/>
+              </a:ext>
+            </a:extLst>
+          </a:blip>
+          <a:srcRect l="24117" r="21251"/>
+          <a:stretch/>
+        </p:blipFill>
+        <p:spPr bwMode="auto">
+          <a:xfrm>
+            <a:off x="9465045" y="1201091"/>
+            <a:ext cx="665076" cy="687233"/>
+          </a:xfrm>
+          <a:prstGeom prst="rect">
+            <a:avLst/>
+          </a:prstGeom>
+          <a:noFill/>
+          <a:extLst>
+            <a:ext uri="{909E8E84-426E-40DD-AFC4-6F175D3DCCD1}">
+              <a14:hiddenFill xmlns:a14="http://schemas.microsoft.com/office/drawing/2010/main">
+                <a:solidFill>
+                  <a:srgbClr val="FFFFFF"/>
+                </a:solidFill>
+              </a14:hiddenFill>
+            </a:ext>
+          </a:extLst>
+        </p:spPr>
+      </p:pic>
+      <p:sp>
+        <p:nvSpPr>
+          <p:cNvPr id="37" name="pole tekstowe 36">
+            <a:extLst>
+              <a:ext uri="{FF2B5EF4-FFF2-40B4-BE49-F238E27FC236}">
+                <a16:creationId xmlns:a16="http://schemas.microsoft.com/office/drawing/2014/main" id="{05DC3BF3-6DCE-4892-BD76-6CAB8AE48142}"/>
+              </a:ext>
+            </a:extLst>
+          </p:cNvPr>
+          <p:cNvSpPr txBox="1"/>
+          <p:nvPr/>
+        </p:nvSpPr>
+        <p:spPr>
+          <a:xfrm>
+            <a:off x="10071871" y="1360041"/>
+            <a:ext cx="505267" cy="369332"/>
+          </a:xfrm>
+          <a:prstGeom prst="rect">
+            <a:avLst/>
+          </a:prstGeom>
+          <a:noFill/>
+        </p:spPr>
+        <p:txBody>
+          <a:bodyPr wrap="none" rtlCol="0">
+            <a:spAutoFit/>
+          </a:bodyPr>
+          <a:lstStyle/>
+          <a:p>
+            <a:r>
+              <a:rPr lang="pl-PL" b="1" dirty="0">
+                <a:solidFill>
+                  <a:srgbClr val="9B4F97"/>
+                </a:solidFill>
+              </a:rPr>
+              <a:t>8.0</a:t>
+            </a:r>
+          </a:p>
+        </p:txBody>
+      </p:sp>
     </p:spTree>
     <p:extLst>
       <p:ext uri="{BB962C8B-B14F-4D97-AF65-F5344CB8AC3E}">
@@ -9206,26 +9694,35 @@
                                   </p:childTnLst>
                                 </p:cTn>
                               </p:par>
-                            </p:childTnLst>
-                          </p:cTn>
-                        </p:par>
-                      </p:childTnLst>
-                    </p:cTn>
-                  </p:par>
-                  <p:par>
-                    <p:cTn id="29" fill="hold">
-                      <p:stCondLst>
-                        <p:cond delay="indefinite"/>
-                      </p:stCondLst>
-                      <p:childTnLst>
-                        <p:par>
-                          <p:cTn id="30" fill="hold">
-                            <p:stCondLst>
-                              <p:cond delay="0"/>
-                            </p:stCondLst>
-                            <p:childTnLst>
                               <p:par>
-                                <p:cTn id="31" presetID="1" presetClass="entr" presetSubtype="0" fill="hold" grpId="0" nodeType="clickEffect">
+                                <p:cTn id="29" presetID="1" presetClass="entr" presetSubtype="0" fill="hold" grpId="0" nodeType="withEffect">
+                                  <p:stCondLst>
+                                    <p:cond delay="0"/>
+                                  </p:stCondLst>
+                                  <p:childTnLst>
+                                    <p:set>
+                                      <p:cBhvr>
+                                        <p:cTn id="30" dur="1" fill="hold">
+                                          <p:stCondLst>
+                                            <p:cond delay="0"/>
+                                          </p:stCondLst>
+                                        </p:cTn>
+                                        <p:tgtEl>
+                                          <p:spTgt spid="27"/>
+                                        </p:tgtEl>
+                                        <p:attrNameLst>
+                                          <p:attrName>style.visibility</p:attrName>
+                                        </p:attrNameLst>
+                                      </p:cBhvr>
+                                      <p:to>
+                                        <p:strVal val="visible"/>
+                                      </p:to>
+                                    </p:set>
+                                  </p:childTnLst>
+                                </p:cTn>
+                              </p:par>
+                              <p:par>
+                                <p:cTn id="31" presetID="1" presetClass="entr" presetSubtype="0" fill="hold" nodeType="withEffect">
                                   <p:stCondLst>
                                     <p:cond delay="0"/>
                                   </p:stCondLst>
@@ -9238,7 +9735,7 @@
                                           </p:stCondLst>
                                         </p:cTn>
                                         <p:tgtEl>
-                                          <p:spTgt spid="28"/>
+                                          <p:spTgt spid="20"/>
                                         </p:tgtEl>
                                         <p:attrNameLst>
                                           <p:attrName>style.visibility</p:attrName>
@@ -9265,7 +9762,7 @@
                                           </p:stCondLst>
                                         </p:cTn>
                                         <p:tgtEl>
-                                          <p:spTgt spid="6"/>
+                                          <p:spTgt spid="21"/>
                                         </p:tgtEl>
                                         <p:attrNameLst>
                                           <p:attrName>style.visibility</p:attrName>
@@ -9292,7 +9789,7 @@
                                           </p:stCondLst>
                                         </p:cTn>
                                         <p:tgtEl>
-                                          <p:spTgt spid="7"/>
+                                          <p:spTgt spid="1050"/>
                                         </p:tgtEl>
                                         <p:attrNameLst>
                                           <p:attrName>style.visibility</p:attrName>
@@ -9306,7 +9803,7 @@
                                 </p:cTn>
                               </p:par>
                               <p:par>
-                                <p:cTn id="37" presetID="1" presetClass="entr" presetSubtype="0" fill="hold" nodeType="withEffect">
+                                <p:cTn id="37" presetID="1" presetClass="entr" presetSubtype="0" fill="hold" grpId="0" nodeType="withEffect">
                                   <p:stCondLst>
                                     <p:cond delay="0"/>
                                   </p:stCondLst>
@@ -9319,7 +9816,7 @@
                                           </p:stCondLst>
                                         </p:cTn>
                                         <p:tgtEl>
-                                          <p:spTgt spid="10"/>
+                                          <p:spTgt spid="24"/>
                                         </p:tgtEl>
                                         <p:attrNameLst>
                                           <p:attrName>style.visibility</p:attrName>
@@ -9346,7 +9843,7 @@
                                           </p:stCondLst>
                                         </p:cTn>
                                         <p:tgtEl>
-                                          <p:spTgt spid="12"/>
+                                          <p:spTgt spid="36"/>
                                         </p:tgtEl>
                                         <p:attrNameLst>
                                           <p:attrName>style.visibility</p:attrName>
@@ -9360,7 +9857,7 @@
                                 </p:cTn>
                               </p:par>
                               <p:par>
-                                <p:cTn id="41" presetID="1" presetClass="entr" presetSubtype="0" fill="hold" nodeType="withEffect">
+                                <p:cTn id="41" presetID="1" presetClass="entr" presetSubtype="0" fill="hold" grpId="0" nodeType="withEffect">
                                   <p:stCondLst>
                                     <p:cond delay="0"/>
                                   </p:stCondLst>
@@ -9373,88 +9870,7 @@
                                           </p:stCondLst>
                                         </p:cTn>
                                         <p:tgtEl>
-                                          <p:spTgt spid="14"/>
-                                        </p:tgtEl>
-                                        <p:attrNameLst>
-                                          <p:attrName>style.visibility</p:attrName>
-                                        </p:attrNameLst>
-                                      </p:cBhvr>
-                                      <p:to>
-                                        <p:strVal val="visible"/>
-                                      </p:to>
-                                    </p:set>
-                                  </p:childTnLst>
-                                </p:cTn>
-                              </p:par>
-                              <p:par>
-                                <p:cTn id="43" presetID="1" presetClass="entr" presetSubtype="0" fill="hold" grpId="0" nodeType="withEffect">
-                                  <p:stCondLst>
-                                    <p:cond delay="0"/>
-                                  </p:stCondLst>
-                                  <p:childTnLst>
-                                    <p:set>
-                                      <p:cBhvr>
-                                        <p:cTn id="44" dur="1" fill="hold">
-                                          <p:stCondLst>
-                                            <p:cond delay="0"/>
-                                          </p:stCondLst>
-                                        </p:cTn>
-                                        <p:tgtEl>
-                                          <p:spTgt spid="18"/>
-                                        </p:tgtEl>
-                                        <p:attrNameLst>
-                                          <p:attrName>style.visibility</p:attrName>
-                                        </p:attrNameLst>
-                                      </p:cBhvr>
-                                      <p:to>
-                                        <p:strVal val="visible"/>
-                                      </p:to>
-                                    </p:set>
-                                  </p:childTnLst>
-                                </p:cTn>
-                              </p:par>
-                              <p:par>
-                                <p:cTn id="45" presetID="1" presetClass="entr" presetSubtype="0" fill="hold" grpId="0" nodeType="withEffect">
-                                  <p:stCondLst>
-                                    <p:cond delay="0"/>
-                                  </p:stCondLst>
-                                  <p:childTnLst>
-                                    <p:set>
-                                      <p:cBhvr>
-                                        <p:cTn id="46" dur="1" fill="hold">
-                                          <p:stCondLst>
-                                            <p:cond delay="0"/>
-                                          </p:stCondLst>
-                                        </p:cTn>
-                                        <p:tgtEl>
-                                          <p:spTgt spid="15"/>
-                                        </p:tgtEl>
-                                        <p:attrNameLst>
-                                          <p:attrName>style.visibility</p:attrName>
-                                        </p:attrNameLst>
-                                      </p:cBhvr>
-                                      <p:to>
-                                        <p:strVal val="visible"/>
-                                      </p:to>
-                                    </p:set>
-                                  </p:childTnLst>
-                                </p:cTn>
-                              </p:par>
-                              <p:par>
-                                <p:cTn id="47" presetID="1" presetClass="entr" presetSubtype="0" fill="hold" grpId="0" nodeType="withEffect">
-                                  <p:stCondLst>
-                                    <p:cond delay="0"/>
-                                  </p:stCondLst>
-                                  <p:childTnLst>
-                                    <p:set>
-                                      <p:cBhvr>
-                                        <p:cTn id="48" dur="1" fill="hold">
-                                          <p:stCondLst>
-                                            <p:cond delay="0"/>
-                                          </p:stCondLst>
-                                        </p:cTn>
-                                        <p:tgtEl>
-                                          <p:spTgt spid="41"/>
+                                          <p:spTgt spid="37"/>
                                         </p:tgtEl>
                                         <p:attrNameLst>
                                           <p:attrName>style.visibility</p:attrName>
@@ -9474,19 +9890,100 @@
                     </p:cTn>
                   </p:par>
                   <p:par>
-                    <p:cTn id="49" fill="hold">
+                    <p:cTn id="43" fill="hold">
                       <p:stCondLst>
                         <p:cond delay="indefinite"/>
                       </p:stCondLst>
                       <p:childTnLst>
                         <p:par>
-                          <p:cTn id="50" fill="hold">
+                          <p:cTn id="44" fill="hold">
                             <p:stCondLst>
                               <p:cond delay="0"/>
                             </p:stCondLst>
                             <p:childTnLst>
                               <p:par>
-                                <p:cTn id="51" presetID="1" presetClass="entr" presetSubtype="0" fill="hold" grpId="0" nodeType="clickEffect">
+                                <p:cTn id="45" presetID="1" presetClass="entr" presetSubtype="0" fill="hold" grpId="0" nodeType="clickEffect">
+                                  <p:stCondLst>
+                                    <p:cond delay="0"/>
+                                  </p:stCondLst>
+                                  <p:childTnLst>
+                                    <p:set>
+                                      <p:cBhvr>
+                                        <p:cTn id="46" dur="1" fill="hold">
+                                          <p:stCondLst>
+                                            <p:cond delay="0"/>
+                                          </p:stCondLst>
+                                        </p:cTn>
+                                        <p:tgtEl>
+                                          <p:spTgt spid="28"/>
+                                        </p:tgtEl>
+                                        <p:attrNameLst>
+                                          <p:attrName>style.visibility</p:attrName>
+                                        </p:attrNameLst>
+                                      </p:cBhvr>
+                                      <p:to>
+                                        <p:strVal val="visible"/>
+                                      </p:to>
+                                    </p:set>
+                                  </p:childTnLst>
+                                </p:cTn>
+                              </p:par>
+                              <p:par>
+                                <p:cTn id="47" presetID="1" presetClass="entr" presetSubtype="0" fill="hold" nodeType="withEffect">
+                                  <p:stCondLst>
+                                    <p:cond delay="0"/>
+                                  </p:stCondLst>
+                                  <p:childTnLst>
+                                    <p:set>
+                                      <p:cBhvr>
+                                        <p:cTn id="48" dur="1" fill="hold">
+                                          <p:stCondLst>
+                                            <p:cond delay="0"/>
+                                          </p:stCondLst>
+                                        </p:cTn>
+                                        <p:tgtEl>
+                                          <p:spTgt spid="6"/>
+                                        </p:tgtEl>
+                                        <p:attrNameLst>
+                                          <p:attrName>style.visibility</p:attrName>
+                                        </p:attrNameLst>
+                                      </p:cBhvr>
+                                      <p:to>
+                                        <p:strVal val="visible"/>
+                                      </p:to>
+                                    </p:set>
+                                  </p:childTnLst>
+                                </p:cTn>
+                              </p:par>
+                              <p:par>
+                                <p:cTn id="49" presetID="1" presetClass="entr" presetSubtype="0" fill="hold" nodeType="withEffect">
+                                  <p:stCondLst>
+                                    <p:cond delay="0"/>
+                                  </p:stCondLst>
+                                  <p:childTnLst>
+                                    <p:set>
+                                      <p:cBhvr>
+                                        <p:cTn id="50" dur="1" fill="hold">
+                                          <p:stCondLst>
+                                            <p:cond delay="0"/>
+                                          </p:stCondLst>
+                                        </p:cTn>
+                                        <p:tgtEl>
+                                          <p:spTgt spid="7"/>
+                                        </p:tgtEl>
+                                        <p:attrNameLst>
+                                          <p:attrName>style.visibility</p:attrName>
+                                        </p:attrNameLst>
+                                      </p:cBhvr>
+                                      <p:to>
+                                        <p:strVal val="visible"/>
+                                      </p:to>
+                                    </p:set>
+                                  </p:childTnLst>
+                                </p:cTn>
+                              </p:par>
+                              <p:par>
+                                <p:cTn id="51" presetID="1" presetClass="entr" presetSubtype="0" fill="hold" nodeType="withEffect">
                                   <p:stCondLst>
                                     <p:cond delay="0"/>
                                   </p:stCondLst>
@@ -9499,7 +9996,7 @@
                                           </p:stCondLst>
                                         </p:cTn>
                                         <p:tgtEl>
-                                          <p:spTgt spid="27"/>
+                                          <p:spTgt spid="10"/>
                                         </p:tgtEl>
                                         <p:attrNameLst>
                                           <p:attrName>style.visibility</p:attrName>
@@ -9526,7 +10023,7 @@
                                           </p:stCondLst>
                                         </p:cTn>
                                         <p:tgtEl>
-                                          <p:spTgt spid="20"/>
+                                          <p:spTgt spid="12"/>
                                         </p:tgtEl>
                                         <p:attrNameLst>
                                           <p:attrName>style.visibility</p:attrName>
@@ -9553,7 +10050,7 @@
                                           </p:stCondLst>
                                         </p:cTn>
                                         <p:tgtEl>
-                                          <p:spTgt spid="21"/>
+                                          <p:spTgt spid="14"/>
                                         </p:tgtEl>
                                         <p:attrNameLst>
                                           <p:attrName>style.visibility</p:attrName>
@@ -9567,7 +10064,7 @@
                                 </p:cTn>
                               </p:par>
                               <p:par>
-                                <p:cTn id="57" presetID="1" presetClass="entr" presetSubtype="0" fill="hold" nodeType="withEffect">
+                                <p:cTn id="57" presetID="1" presetClass="entr" presetSubtype="0" fill="hold" grpId="0" nodeType="withEffect">
                                   <p:stCondLst>
                                     <p:cond delay="0"/>
                                   </p:stCondLst>
@@ -9580,7 +10077,7 @@
                                           </p:stCondLst>
                                         </p:cTn>
                                         <p:tgtEl>
-                                          <p:spTgt spid="1050"/>
+                                          <p:spTgt spid="18"/>
                                         </p:tgtEl>
                                         <p:attrNameLst>
                                           <p:attrName>style.visibility</p:attrName>
@@ -9607,7 +10104,34 @@
                                           </p:stCondLst>
                                         </p:cTn>
                                         <p:tgtEl>
-                                          <p:spTgt spid="24"/>
+                                          <p:spTgt spid="15"/>
+                                        </p:tgtEl>
+                                        <p:attrNameLst>
+                                          <p:attrName>style.visibility</p:attrName>
+                                        </p:attrNameLst>
+                                      </p:cBhvr>
+                                      <p:to>
+                                        <p:strVal val="visible"/>
+                                      </p:to>
+                                    </p:set>
+                                  </p:childTnLst>
+                                </p:cTn>
+                              </p:par>
+                              <p:par>
+                                <p:cTn id="61" presetID="1" presetClass="entr" presetSubtype="0" fill="hold" grpId="0" nodeType="withEffect">
+                                  <p:stCondLst>
+                                    <p:cond delay="0"/>
+                                  </p:stCondLst>
+                                  <p:childTnLst>
+                                    <p:set>
+                                      <p:cBhvr>
+                                        <p:cTn id="62" dur="1" fill="hold">
+                                          <p:stCondLst>
+                                            <p:cond delay="0"/>
+                                          </p:stCondLst>
+                                        </p:cTn>
+                                        <p:tgtEl>
+                                          <p:spTgt spid="41"/>
                                         </p:tgtEl>
                                         <p:attrNameLst>
                                           <p:attrName>style.visibility</p:attrName>
@@ -9657,6 +10181,7 @@
       <p:bldP spid="23" grpId="0"/>
       <p:bldP spid="24" grpId="0"/>
       <p:bldP spid="41" grpId="0"/>
+      <p:bldP spid="37" grpId="0"/>
     </p:bldLst>
   </p:timing>
 </p:sld>
@@ -9768,7 +10293,7 @@
         </p:blipFill>
         <p:spPr>
           <a:xfrm>
-            <a:off x="1156549" y="1086249"/>
+            <a:off x="1110531" y="1104650"/>
             <a:ext cx="10515600" cy="5683818"/>
           </a:xfrm>
           <a:prstGeom prst="rect">
@@ -9776,6 +10301,867 @@
           </a:prstGeom>
         </p:spPr>
       </p:pic>
+      <p:sp>
+        <p:nvSpPr>
+          <p:cNvPr id="5" name="Nawias klamrowy otwierający 4">
+            <a:extLst>
+              <a:ext uri="{FF2B5EF4-FFF2-40B4-BE49-F238E27FC236}">
+                <a16:creationId xmlns:a16="http://schemas.microsoft.com/office/drawing/2014/main" id="{7581CDF7-59D2-4523-8256-8D9FB65C139D}"/>
+              </a:ext>
+            </a:extLst>
+          </p:cNvPr>
+          <p:cNvSpPr/>
+          <p:nvPr/>
+        </p:nvSpPr>
+        <p:spPr>
+          <a:xfrm rot="10800000">
+            <a:off x="6972299" y="1714486"/>
+            <a:ext cx="533840" cy="667692"/>
+          </a:xfrm>
+          <a:custGeom>
+            <a:avLst/>
+            <a:gdLst>
+              <a:gd name="connsiteX0" fmla="*/ 533840 w 533840"/>
+              <a:gd name="connsiteY0" fmla="*/ 667692 h 667692"/>
+              <a:gd name="connsiteX1" fmla="*/ 266920 w 533840"/>
+              <a:gd name="connsiteY1" fmla="*/ 623207 h 667692"/>
+              <a:gd name="connsiteX2" fmla="*/ 266920 w 533840"/>
+              <a:gd name="connsiteY2" fmla="*/ 375874 h 667692"/>
+              <a:gd name="connsiteX3" fmla="*/ 0 w 533840"/>
+              <a:gd name="connsiteY3" fmla="*/ 331389 h 667692"/>
+              <a:gd name="connsiteX4" fmla="*/ 266920 w 533840"/>
+              <a:gd name="connsiteY4" fmla="*/ 286904 h 667692"/>
+              <a:gd name="connsiteX5" fmla="*/ 266920 w 533840"/>
+              <a:gd name="connsiteY5" fmla="*/ 44485 h 667692"/>
+              <a:gd name="connsiteX6" fmla="*/ 533840 w 533840"/>
+              <a:gd name="connsiteY6" fmla="*/ 0 h 667692"/>
+              <a:gd name="connsiteX7" fmla="*/ 533840 w 533840"/>
+              <a:gd name="connsiteY7" fmla="*/ 667692 h 667692"/>
+              <a:gd name="connsiteX0" fmla="*/ 533840 w 533840"/>
+              <a:gd name="connsiteY0" fmla="*/ 667692 h 667692"/>
+              <a:gd name="connsiteX1" fmla="*/ 266920 w 533840"/>
+              <a:gd name="connsiteY1" fmla="*/ 623207 h 667692"/>
+              <a:gd name="connsiteX2" fmla="*/ 266920 w 533840"/>
+              <a:gd name="connsiteY2" fmla="*/ 375874 h 667692"/>
+              <a:gd name="connsiteX3" fmla="*/ 0 w 533840"/>
+              <a:gd name="connsiteY3" fmla="*/ 331389 h 667692"/>
+              <a:gd name="connsiteX4" fmla="*/ 266920 w 533840"/>
+              <a:gd name="connsiteY4" fmla="*/ 286904 h 667692"/>
+              <a:gd name="connsiteX5" fmla="*/ 266920 w 533840"/>
+              <a:gd name="connsiteY5" fmla="*/ 44485 h 667692"/>
+              <a:gd name="connsiteX6" fmla="*/ 533840 w 533840"/>
+              <a:gd name="connsiteY6" fmla="*/ 0 h 667692"/>
+            </a:gdLst>
+            <a:ahLst/>
+            <a:cxnLst>
+              <a:cxn ang="0">
+                <a:pos x="connsiteX0" y="connsiteY0"/>
+              </a:cxn>
+              <a:cxn ang="0">
+                <a:pos x="connsiteX1" y="connsiteY1"/>
+              </a:cxn>
+              <a:cxn ang="0">
+                <a:pos x="connsiteX2" y="connsiteY2"/>
+              </a:cxn>
+              <a:cxn ang="0">
+                <a:pos x="connsiteX3" y="connsiteY3"/>
+              </a:cxn>
+              <a:cxn ang="0">
+                <a:pos x="connsiteX4" y="connsiteY4"/>
+              </a:cxn>
+              <a:cxn ang="0">
+                <a:pos x="connsiteX5" y="connsiteY5"/>
+              </a:cxn>
+              <a:cxn ang="0">
+                <a:pos x="connsiteX6" y="connsiteY6"/>
+              </a:cxn>
+            </a:cxnLst>
+            <a:rect l="l" t="t" r="r" b="b"/>
+            <a:pathLst>
+              <a:path w="533840" h="667692" stroke="0" extrusionOk="0">
+                <a:moveTo>
+                  <a:pt x="533840" y="667692"/>
+                </a:moveTo>
+                <a:cubicBezTo>
+                  <a:pt x="386751" y="669873"/>
+                  <a:pt x="266072" y="651993"/>
+                  <a:pt x="266920" y="623207"/>
+                </a:cubicBezTo>
+                <a:cubicBezTo>
+                  <a:pt x="250690" y="577971"/>
+                  <a:pt x="283321" y="487986"/>
+                  <a:pt x="266920" y="375874"/>
+                </a:cubicBezTo>
+                <a:cubicBezTo>
+                  <a:pt x="278406" y="344413"/>
+                  <a:pt x="137551" y="326702"/>
+                  <a:pt x="0" y="331389"/>
+                </a:cubicBezTo>
+                <a:cubicBezTo>
+                  <a:pt x="148318" y="332408"/>
+                  <a:pt x="270551" y="313249"/>
+                  <a:pt x="266920" y="286904"/>
+                </a:cubicBezTo>
+                <a:cubicBezTo>
+                  <a:pt x="283054" y="249448"/>
+                  <a:pt x="281208" y="98134"/>
+                  <a:pt x="266920" y="44485"/>
+                </a:cubicBezTo>
+                <a:cubicBezTo>
+                  <a:pt x="258974" y="26168"/>
+                  <a:pt x="403459" y="14239"/>
+                  <a:pt x="533840" y="0"/>
+                </a:cubicBezTo>
+                <a:cubicBezTo>
+                  <a:pt x="565255" y="296230"/>
+                  <a:pt x="549007" y="533676"/>
+                  <a:pt x="533840" y="667692"/>
+                </a:cubicBezTo>
+                <a:close/>
+              </a:path>
+              <a:path w="533840" h="667692" fill="none" extrusionOk="0">
+                <a:moveTo>
+                  <a:pt x="533840" y="667692"/>
+                </a:moveTo>
+                <a:cubicBezTo>
+                  <a:pt x="386652" y="668923"/>
+                  <a:pt x="267963" y="647037"/>
+                  <a:pt x="266920" y="623207"/>
+                </a:cubicBezTo>
+                <a:cubicBezTo>
+                  <a:pt x="261175" y="537055"/>
+                  <a:pt x="288078" y="482547"/>
+                  <a:pt x="266920" y="375874"/>
+                </a:cubicBezTo>
+                <a:cubicBezTo>
+                  <a:pt x="283411" y="367811"/>
+                  <a:pt x="161835" y="314770"/>
+                  <a:pt x="0" y="331389"/>
+                </a:cubicBezTo>
+                <a:cubicBezTo>
+                  <a:pt x="150179" y="331909"/>
+                  <a:pt x="266098" y="311804"/>
+                  <a:pt x="266920" y="286904"/>
+                </a:cubicBezTo>
+                <a:cubicBezTo>
+                  <a:pt x="256926" y="209791"/>
+                  <a:pt x="247470" y="159547"/>
+                  <a:pt x="266920" y="44485"/>
+                </a:cubicBezTo>
+                <a:cubicBezTo>
+                  <a:pt x="247289" y="23845"/>
+                  <a:pt x="387469" y="-2176"/>
+                  <a:pt x="533840" y="0"/>
+                </a:cubicBezTo>
+              </a:path>
+            </a:pathLst>
+          </a:custGeom>
+          <a:ln w="19050">
+            <a:solidFill>
+              <a:schemeClr val="tx1">
+                <a:lumMod val="50000"/>
+                <a:lumOff val="50000"/>
+              </a:schemeClr>
+            </a:solidFill>
+            <a:extLst>
+              <a:ext uri="{C807C97D-BFC1-408E-A445-0C87EB9F89A2}">
+                <ask:lineSketchStyleProps xmlns:ask="http://schemas.microsoft.com/office/drawing/2018/sketchyshapes" sd="431491757">
+                  <a:prstGeom prst="leftBrace">
+                    <a:avLst>
+                      <a:gd name="adj1" fmla="val 8333"/>
+                      <a:gd name="adj2" fmla="val 49632"/>
+                    </a:avLst>
+                  </a:prstGeom>
+                  <ask:type>
+                    <ask:lineSketchCurved/>
+                  </ask:type>
+                </ask:lineSketchStyleProps>
+              </a:ext>
+            </a:extLst>
+          </a:ln>
+        </p:spPr>
+        <p:style>
+          <a:lnRef idx="1">
+            <a:schemeClr val="accent1"/>
+          </a:lnRef>
+          <a:fillRef idx="0">
+            <a:schemeClr val="accent1"/>
+          </a:fillRef>
+          <a:effectRef idx="0">
+            <a:schemeClr val="accent1"/>
+          </a:effectRef>
+          <a:fontRef idx="minor">
+            <a:schemeClr val="tx1"/>
+          </a:fontRef>
+        </p:style>
+        <p:txBody>
+          <a:bodyPr rtlCol="0" anchor="ctr"/>
+          <a:lstStyle/>
+          <a:p>
+            <a:pPr algn="ctr"/>
+            <a:endParaRPr lang="pl-PL">
+              <a:solidFill>
+                <a:schemeClr val="accent3">
+                  <a:lumMod val="75000"/>
+                </a:schemeClr>
+              </a:solidFill>
+            </a:endParaRPr>
+          </a:p>
+        </p:txBody>
+      </p:sp>
+      <p:sp>
+        <p:nvSpPr>
+          <p:cNvPr id="6" name="Nawias klamrowy otwierający 5">
+            <a:extLst>
+              <a:ext uri="{FF2B5EF4-FFF2-40B4-BE49-F238E27FC236}">
+                <a16:creationId xmlns:a16="http://schemas.microsoft.com/office/drawing/2014/main" id="{83948794-07F5-43C4-A376-984C99B79E1E}"/>
+              </a:ext>
+            </a:extLst>
+          </p:cNvPr>
+          <p:cNvSpPr/>
+          <p:nvPr/>
+        </p:nvSpPr>
+        <p:spPr>
+          <a:xfrm>
+            <a:off x="5269546" y="1714486"/>
+            <a:ext cx="107951" cy="667692"/>
+          </a:xfrm>
+          <a:custGeom>
+            <a:avLst/>
+            <a:gdLst>
+              <a:gd name="connsiteX0" fmla="*/ 107951 w 107951"/>
+              <a:gd name="connsiteY0" fmla="*/ 667692 h 667692"/>
+              <a:gd name="connsiteX1" fmla="*/ 53975 w 107951"/>
+              <a:gd name="connsiteY1" fmla="*/ 658696 h 667692"/>
+              <a:gd name="connsiteX2" fmla="*/ 53976 w 107951"/>
+              <a:gd name="connsiteY2" fmla="*/ 340384 h 667692"/>
+              <a:gd name="connsiteX3" fmla="*/ 0 w 107951"/>
+              <a:gd name="connsiteY3" fmla="*/ 331388 h 667692"/>
+              <a:gd name="connsiteX4" fmla="*/ 53976 w 107951"/>
+              <a:gd name="connsiteY4" fmla="*/ 322392 h 667692"/>
+              <a:gd name="connsiteX5" fmla="*/ 53976 w 107951"/>
+              <a:gd name="connsiteY5" fmla="*/ 8996 h 667692"/>
+              <a:gd name="connsiteX6" fmla="*/ 107952 w 107951"/>
+              <a:gd name="connsiteY6" fmla="*/ 0 h 667692"/>
+              <a:gd name="connsiteX7" fmla="*/ 107951 w 107951"/>
+              <a:gd name="connsiteY7" fmla="*/ 667692 h 667692"/>
+              <a:gd name="connsiteX0" fmla="*/ 107951 w 107951"/>
+              <a:gd name="connsiteY0" fmla="*/ 667692 h 667692"/>
+              <a:gd name="connsiteX1" fmla="*/ 53975 w 107951"/>
+              <a:gd name="connsiteY1" fmla="*/ 658696 h 667692"/>
+              <a:gd name="connsiteX2" fmla="*/ 53976 w 107951"/>
+              <a:gd name="connsiteY2" fmla="*/ 340384 h 667692"/>
+              <a:gd name="connsiteX3" fmla="*/ 0 w 107951"/>
+              <a:gd name="connsiteY3" fmla="*/ 331388 h 667692"/>
+              <a:gd name="connsiteX4" fmla="*/ 53976 w 107951"/>
+              <a:gd name="connsiteY4" fmla="*/ 322392 h 667692"/>
+              <a:gd name="connsiteX5" fmla="*/ 53976 w 107951"/>
+              <a:gd name="connsiteY5" fmla="*/ 8996 h 667692"/>
+              <a:gd name="connsiteX6" fmla="*/ 107952 w 107951"/>
+              <a:gd name="connsiteY6" fmla="*/ 0 h 667692"/>
+            </a:gdLst>
+            <a:ahLst/>
+            <a:cxnLst>
+              <a:cxn ang="0">
+                <a:pos x="connsiteX0" y="connsiteY0"/>
+              </a:cxn>
+              <a:cxn ang="0">
+                <a:pos x="connsiteX1" y="connsiteY1"/>
+              </a:cxn>
+              <a:cxn ang="0">
+                <a:pos x="connsiteX2" y="connsiteY2"/>
+              </a:cxn>
+              <a:cxn ang="0">
+                <a:pos x="connsiteX3" y="connsiteY3"/>
+              </a:cxn>
+              <a:cxn ang="0">
+                <a:pos x="connsiteX4" y="connsiteY4"/>
+              </a:cxn>
+              <a:cxn ang="0">
+                <a:pos x="connsiteX5" y="connsiteY5"/>
+              </a:cxn>
+              <a:cxn ang="0">
+                <a:pos x="connsiteX6" y="connsiteY6"/>
+              </a:cxn>
+            </a:cxnLst>
+            <a:rect l="l" t="t" r="r" b="b"/>
+            <a:pathLst>
+              <a:path w="107951" h="667692" stroke="0" extrusionOk="0">
+                <a:moveTo>
+                  <a:pt x="107951" y="667692"/>
+                </a:moveTo>
+                <a:cubicBezTo>
+                  <a:pt x="78248" y="668409"/>
+                  <a:pt x="53944" y="663816"/>
+                  <a:pt x="53975" y="658696"/>
+                </a:cubicBezTo>
+                <a:cubicBezTo>
+                  <a:pt x="39644" y="563758"/>
+                  <a:pt x="51277" y="438015"/>
+                  <a:pt x="53976" y="340384"/>
+                </a:cubicBezTo>
+                <a:cubicBezTo>
+                  <a:pt x="54251" y="335251"/>
+                  <a:pt x="27731" y="330400"/>
+                  <a:pt x="0" y="331388"/>
+                </a:cubicBezTo>
+                <a:cubicBezTo>
+                  <a:pt x="30409" y="332066"/>
+                  <a:pt x="54188" y="327464"/>
+                  <a:pt x="53976" y="322392"/>
+                </a:cubicBezTo>
+                <a:cubicBezTo>
+                  <a:pt x="43045" y="289139"/>
+                  <a:pt x="47097" y="136440"/>
+                  <a:pt x="53976" y="8996"/>
+                </a:cubicBezTo>
+                <a:cubicBezTo>
+                  <a:pt x="52520" y="5174"/>
+                  <a:pt x="80547" y="2010"/>
+                  <a:pt x="107952" y="0"/>
+                </a:cubicBezTo>
+                <a:cubicBezTo>
+                  <a:pt x="90485" y="246189"/>
+                  <a:pt x="128277" y="473701"/>
+                  <a:pt x="107951" y="667692"/>
+                </a:cubicBezTo>
+                <a:close/>
+              </a:path>
+              <a:path w="107951" h="667692" fill="none" extrusionOk="0">
+                <a:moveTo>
+                  <a:pt x="107951" y="667692"/>
+                </a:moveTo>
+                <a:cubicBezTo>
+                  <a:pt x="78177" y="667888"/>
+                  <a:pt x="54225" y="663487"/>
+                  <a:pt x="53975" y="658696"/>
+                </a:cubicBezTo>
+                <a:cubicBezTo>
+                  <a:pt x="69724" y="544438"/>
+                  <a:pt x="50913" y="446845"/>
+                  <a:pt x="53976" y="340384"/>
+                </a:cubicBezTo>
+                <a:cubicBezTo>
+                  <a:pt x="55659" y="337101"/>
+                  <a:pt x="32254" y="328571"/>
+                  <a:pt x="0" y="331388"/>
+                </a:cubicBezTo>
+                <a:cubicBezTo>
+                  <a:pt x="30236" y="331468"/>
+                  <a:pt x="53477" y="327562"/>
+                  <a:pt x="53976" y="322392"/>
+                </a:cubicBezTo>
+                <a:cubicBezTo>
+                  <a:pt x="42563" y="250297"/>
+                  <a:pt x="75026" y="162031"/>
+                  <a:pt x="53976" y="8996"/>
+                </a:cubicBezTo>
+                <a:cubicBezTo>
+                  <a:pt x="53489" y="4125"/>
+                  <a:pt x="79437" y="-2696"/>
+                  <a:pt x="107952" y="0"/>
+                </a:cubicBezTo>
+              </a:path>
+            </a:pathLst>
+          </a:custGeom>
+          <a:ln w="19050">
+            <a:solidFill>
+              <a:schemeClr val="tx1">
+                <a:lumMod val="50000"/>
+                <a:lumOff val="50000"/>
+              </a:schemeClr>
+            </a:solidFill>
+            <a:extLst>
+              <a:ext uri="{C807C97D-BFC1-408E-A445-0C87EB9F89A2}">
+                <ask:lineSketchStyleProps xmlns:ask="http://schemas.microsoft.com/office/drawing/2018/sketchyshapes" sd="431491757">
+                  <a:prstGeom prst="leftBrace">
+                    <a:avLst>
+                      <a:gd name="adj1" fmla="val 8333"/>
+                      <a:gd name="adj2" fmla="val 49632"/>
+                    </a:avLst>
+                  </a:prstGeom>
+                  <ask:type>
+                    <ask:lineSketchCurved/>
+                  </ask:type>
+                </ask:lineSketchStyleProps>
+              </a:ext>
+            </a:extLst>
+          </a:ln>
+        </p:spPr>
+        <p:style>
+          <a:lnRef idx="1">
+            <a:schemeClr val="accent1"/>
+          </a:lnRef>
+          <a:fillRef idx="0">
+            <a:schemeClr val="accent1"/>
+          </a:fillRef>
+          <a:effectRef idx="0">
+            <a:schemeClr val="accent1"/>
+          </a:effectRef>
+          <a:fontRef idx="minor">
+            <a:schemeClr val="tx1"/>
+          </a:fontRef>
+        </p:style>
+        <p:txBody>
+          <a:bodyPr rtlCol="0" anchor="ctr"/>
+          <a:lstStyle/>
+          <a:p>
+            <a:pPr algn="ctr"/>
+            <a:endParaRPr lang="pl-PL">
+              <a:solidFill>
+                <a:schemeClr val="accent3">
+                  <a:lumMod val="75000"/>
+                </a:schemeClr>
+              </a:solidFill>
+            </a:endParaRPr>
+          </a:p>
+        </p:txBody>
+      </p:sp>
+      <p:cxnSp>
+        <p:nvCxnSpPr>
+          <p:cNvPr id="7" name="Łącznik prosty 6">
+            <a:extLst>
+              <a:ext uri="{FF2B5EF4-FFF2-40B4-BE49-F238E27FC236}">
+                <a16:creationId xmlns:a16="http://schemas.microsoft.com/office/drawing/2014/main" id="{B8EFF8B9-34C5-4BA2-8571-5C1BF71C7593}"/>
+              </a:ext>
+            </a:extLst>
+          </p:cNvPr>
+          <p:cNvCxnSpPr>
+            <a:stCxn id="5" idx="1"/>
+          </p:cNvCxnSpPr>
+          <p:nvPr/>
+        </p:nvCxnSpPr>
+        <p:spPr>
+          <a:xfrm flipV="1">
+            <a:off x="7506139" y="2048332"/>
+            <a:ext cx="1107636" cy="2457"/>
+          </a:xfrm>
+          <a:prstGeom prst="line">
+            <a:avLst/>
+          </a:prstGeom>
+          <a:ln w="19050">
+            <a:solidFill>
+              <a:schemeClr val="tx1">
+                <a:lumMod val="50000"/>
+                <a:lumOff val="50000"/>
+              </a:schemeClr>
+            </a:solidFill>
+          </a:ln>
+        </p:spPr>
+        <p:style>
+          <a:lnRef idx="1">
+            <a:schemeClr val="accent5"/>
+          </a:lnRef>
+          <a:fillRef idx="0">
+            <a:schemeClr val="accent5"/>
+          </a:fillRef>
+          <a:effectRef idx="0">
+            <a:schemeClr val="accent5"/>
+          </a:effectRef>
+          <a:fontRef idx="minor">
+            <a:schemeClr val="tx1"/>
+          </a:fontRef>
+        </p:style>
+      </p:cxnSp>
+      <p:sp>
+        <p:nvSpPr>
+          <p:cNvPr id="9" name="pole tekstowe 8">
+            <a:extLst>
+              <a:ext uri="{FF2B5EF4-FFF2-40B4-BE49-F238E27FC236}">
+                <a16:creationId xmlns:a16="http://schemas.microsoft.com/office/drawing/2014/main" id="{C65489FC-14EF-42D7-B1AE-43E28AF3B0BF}"/>
+              </a:ext>
+            </a:extLst>
+          </p:cNvPr>
+          <p:cNvSpPr txBox="1"/>
+          <p:nvPr/>
+        </p:nvSpPr>
+        <p:spPr>
+          <a:xfrm>
+            <a:off x="8613774" y="1682087"/>
+            <a:ext cx="2390911" cy="738664"/>
+          </a:xfrm>
+          <a:prstGeom prst="rect">
+            <a:avLst/>
+          </a:prstGeom>
+          <a:noFill/>
+        </p:spPr>
+        <p:txBody>
+          <a:bodyPr wrap="square" rtlCol="0">
+            <a:spAutoFit/>
+          </a:bodyPr>
+          <a:lstStyle/>
+          <a:p>
+            <a:pPr algn="ctr"/>
+            <a:r>
+              <a:rPr lang="pl-PL" sz="1400" b="1" dirty="0">
+                <a:solidFill>
+                  <a:schemeClr val="tx1">
+                    <a:lumMod val="65000"/>
+                    <a:lumOff val="35000"/>
+                  </a:schemeClr>
+                </a:solidFill>
+              </a:rPr>
+              <a:t>Informacje o stworzeniu i ostatniej edycji rekordu </a:t>
+            </a:r>
+            <a:r>
+              <a:rPr lang="pl-PL" sz="1400" dirty="0">
+                <a:solidFill>
+                  <a:schemeClr val="tx1">
+                    <a:lumMod val="65000"/>
+                    <a:lumOff val="35000"/>
+                  </a:schemeClr>
+                </a:solidFill>
+              </a:rPr>
+              <a:t>w każdej tabeli</a:t>
+            </a:r>
+          </a:p>
+        </p:txBody>
+      </p:sp>
+      <p:sp>
+        <p:nvSpPr>
+          <p:cNvPr id="10" name="pole tekstowe 9">
+            <a:extLst>
+              <a:ext uri="{FF2B5EF4-FFF2-40B4-BE49-F238E27FC236}">
+                <a16:creationId xmlns:a16="http://schemas.microsoft.com/office/drawing/2014/main" id="{CE848D90-CE9D-4076-9515-7F1AFAED7C19}"/>
+              </a:ext>
+            </a:extLst>
+          </p:cNvPr>
+          <p:cNvSpPr txBox="1"/>
+          <p:nvPr/>
+        </p:nvSpPr>
+        <p:spPr>
+          <a:xfrm>
+            <a:off x="8306936" y="2482973"/>
+            <a:ext cx="3033169" cy="954107"/>
+          </a:xfrm>
+          <a:prstGeom prst="rect">
+            <a:avLst/>
+          </a:prstGeom>
+          <a:noFill/>
+        </p:spPr>
+        <p:txBody>
+          <a:bodyPr wrap="square" rtlCol="0">
+            <a:spAutoFit/>
+          </a:bodyPr>
+          <a:lstStyle/>
+          <a:p>
+            <a:pPr algn="ctr"/>
+            <a:r>
+              <a:rPr lang="pl-PL" sz="1400" b="1" u="sng" dirty="0" err="1">
+                <a:solidFill>
+                  <a:schemeClr val="accent4">
+                    <a:lumMod val="75000"/>
+                  </a:schemeClr>
+                </a:solidFill>
+              </a:rPr>
+              <a:t>AuditLog</a:t>
+            </a:r>
+            <a:r>
+              <a:rPr lang="pl-PL" sz="1400" b="1" u="sng" dirty="0">
+                <a:solidFill>
+                  <a:schemeClr val="accent4">
+                    <a:lumMod val="75000"/>
+                  </a:schemeClr>
+                </a:solidFill>
+              </a:rPr>
+              <a:t>:</a:t>
+            </a:r>
+            <a:r>
+              <a:rPr lang="pl-PL" sz="1400" b="1" dirty="0">
+                <a:solidFill>
+                  <a:schemeClr val="accent4">
+                    <a:lumMod val="75000"/>
+                  </a:schemeClr>
+                </a:solidFill>
+              </a:rPr>
+              <a:t> rozszerzone informacje o historii zmian w każdym rekordzie każdej tabeli </a:t>
+            </a:r>
+            <a:br>
+              <a:rPr lang="pl-PL" sz="1400" dirty="0">
+                <a:solidFill>
+                  <a:schemeClr val="accent4">
+                    <a:lumMod val="75000"/>
+                  </a:schemeClr>
+                </a:solidFill>
+              </a:rPr>
+            </a:br>
+            <a:r>
+              <a:rPr lang="pl-PL" sz="1400" dirty="0">
+                <a:solidFill>
+                  <a:schemeClr val="accent4">
+                    <a:lumMod val="75000"/>
+                  </a:schemeClr>
+                </a:solidFill>
+              </a:rPr>
+              <a:t>(+ możliwość cofania zmian)</a:t>
+            </a:r>
+          </a:p>
+        </p:txBody>
+      </p:sp>
+      <p:sp>
+        <p:nvSpPr>
+          <p:cNvPr id="20" name="Nawias zamykający 19">
+            <a:extLst>
+              <a:ext uri="{FF2B5EF4-FFF2-40B4-BE49-F238E27FC236}">
+                <a16:creationId xmlns:a16="http://schemas.microsoft.com/office/drawing/2014/main" id="{F3405A8E-AF3C-4084-8306-30015B336F3E}"/>
+              </a:ext>
+            </a:extLst>
+          </p:cNvPr>
+          <p:cNvSpPr/>
+          <p:nvPr/>
+        </p:nvSpPr>
+        <p:spPr>
+          <a:xfrm>
+            <a:off x="11626131" y="3002280"/>
+            <a:ext cx="299720" cy="2723506"/>
+          </a:xfrm>
+          <a:custGeom>
+            <a:avLst/>
+            <a:gdLst>
+              <a:gd name="connsiteX0" fmla="*/ 0 w 299720"/>
+              <a:gd name="connsiteY0" fmla="*/ 0 h 2723506"/>
+              <a:gd name="connsiteX1" fmla="*/ 299720 w 299720"/>
+              <a:gd name="connsiteY1" fmla="*/ 24976 h 2723506"/>
+              <a:gd name="connsiteX2" fmla="*/ 299720 w 299720"/>
+              <a:gd name="connsiteY2" fmla="*/ 746836 h 2723506"/>
+              <a:gd name="connsiteX3" fmla="*/ 299720 w 299720"/>
+              <a:gd name="connsiteY3" fmla="*/ 1388489 h 2723506"/>
+              <a:gd name="connsiteX4" fmla="*/ 299720 w 299720"/>
+              <a:gd name="connsiteY4" fmla="*/ 2003406 h 2723506"/>
+              <a:gd name="connsiteX5" fmla="*/ 299720 w 299720"/>
+              <a:gd name="connsiteY5" fmla="*/ 2698530 h 2723506"/>
+              <a:gd name="connsiteX6" fmla="*/ 0 w 299720"/>
+              <a:gd name="connsiteY6" fmla="*/ 2723506 h 2723506"/>
+              <a:gd name="connsiteX7" fmla="*/ 0 w 299720"/>
+              <a:gd name="connsiteY7" fmla="*/ 2042630 h 2723506"/>
+              <a:gd name="connsiteX8" fmla="*/ 0 w 299720"/>
+              <a:gd name="connsiteY8" fmla="*/ 1307283 h 2723506"/>
+              <a:gd name="connsiteX9" fmla="*/ 0 w 299720"/>
+              <a:gd name="connsiteY9" fmla="*/ 708112 h 2723506"/>
+              <a:gd name="connsiteX10" fmla="*/ 0 w 299720"/>
+              <a:gd name="connsiteY10" fmla="*/ 0 h 2723506"/>
+              <a:gd name="connsiteX0" fmla="*/ 0 w 299720"/>
+              <a:gd name="connsiteY0" fmla="*/ 0 h 2723506"/>
+              <a:gd name="connsiteX1" fmla="*/ 299720 w 299720"/>
+              <a:gd name="connsiteY1" fmla="*/ 24976 h 2723506"/>
+              <a:gd name="connsiteX2" fmla="*/ 299720 w 299720"/>
+              <a:gd name="connsiteY2" fmla="*/ 613158 h 2723506"/>
+              <a:gd name="connsiteX3" fmla="*/ 299720 w 299720"/>
+              <a:gd name="connsiteY3" fmla="*/ 1335017 h 2723506"/>
+              <a:gd name="connsiteX4" fmla="*/ 299720 w 299720"/>
+              <a:gd name="connsiteY4" fmla="*/ 1949935 h 2723506"/>
+              <a:gd name="connsiteX5" fmla="*/ 299720 w 299720"/>
+              <a:gd name="connsiteY5" fmla="*/ 2698530 h 2723506"/>
+              <a:gd name="connsiteX6" fmla="*/ 0 w 299720"/>
+              <a:gd name="connsiteY6" fmla="*/ 2723506 h 2723506"/>
+            </a:gdLst>
+            <a:ahLst/>
+            <a:cxnLst>
+              <a:cxn ang="0">
+                <a:pos x="connsiteX0" y="connsiteY0"/>
+              </a:cxn>
+              <a:cxn ang="0">
+                <a:pos x="connsiteX1" y="connsiteY1"/>
+              </a:cxn>
+              <a:cxn ang="0">
+                <a:pos x="connsiteX2" y="connsiteY2"/>
+              </a:cxn>
+              <a:cxn ang="0">
+                <a:pos x="connsiteX3" y="connsiteY3"/>
+              </a:cxn>
+              <a:cxn ang="0">
+                <a:pos x="connsiteX4" y="connsiteY4"/>
+              </a:cxn>
+              <a:cxn ang="0">
+                <a:pos x="connsiteX5" y="connsiteY5"/>
+              </a:cxn>
+              <a:cxn ang="0">
+                <a:pos x="connsiteX6" y="connsiteY6"/>
+              </a:cxn>
+            </a:cxnLst>
+            <a:rect l="l" t="t" r="r" b="b"/>
+            <a:pathLst>
+              <a:path w="299720" h="2723506" stroke="0" extrusionOk="0">
+                <a:moveTo>
+                  <a:pt x="0" y="0"/>
+                </a:moveTo>
+                <a:cubicBezTo>
+                  <a:pt x="162768" y="-1704"/>
+                  <a:pt x="297270" y="12102"/>
+                  <a:pt x="299720" y="24976"/>
+                </a:cubicBezTo>
+                <a:cubicBezTo>
+                  <a:pt x="271696" y="182714"/>
+                  <a:pt x="268770" y="445734"/>
+                  <a:pt x="299720" y="746836"/>
+                </a:cubicBezTo>
+                <a:cubicBezTo>
+                  <a:pt x="330670" y="1047938"/>
+                  <a:pt x="277665" y="1152755"/>
+                  <a:pt x="299720" y="1388489"/>
+                </a:cubicBezTo>
+                <a:cubicBezTo>
+                  <a:pt x="321775" y="1624223"/>
+                  <a:pt x="292446" y="1870623"/>
+                  <a:pt x="299720" y="2003406"/>
+                </a:cubicBezTo>
+                <a:cubicBezTo>
+                  <a:pt x="306994" y="2136189"/>
+                  <a:pt x="272119" y="2464515"/>
+                  <a:pt x="299720" y="2698530"/>
+                </a:cubicBezTo>
+                <a:cubicBezTo>
+                  <a:pt x="311431" y="2688222"/>
+                  <a:pt x="152718" y="2721544"/>
+                  <a:pt x="0" y="2723506"/>
+                </a:cubicBezTo>
+                <a:cubicBezTo>
+                  <a:pt x="-9088" y="2419200"/>
+                  <a:pt x="24241" y="2280849"/>
+                  <a:pt x="0" y="2042630"/>
+                </a:cubicBezTo>
+                <a:cubicBezTo>
+                  <a:pt x="-24241" y="1804411"/>
+                  <a:pt x="-12414" y="1654977"/>
+                  <a:pt x="0" y="1307283"/>
+                </a:cubicBezTo>
+                <a:cubicBezTo>
+                  <a:pt x="12414" y="959589"/>
+                  <a:pt x="-5935" y="895056"/>
+                  <a:pt x="0" y="708112"/>
+                </a:cubicBezTo>
+                <a:cubicBezTo>
+                  <a:pt x="5935" y="521168"/>
+                  <a:pt x="24007" y="343936"/>
+                  <a:pt x="0" y="0"/>
+                </a:cubicBezTo>
+                <a:close/>
+              </a:path>
+              <a:path w="299720" h="2723506" fill="none" extrusionOk="0">
+                <a:moveTo>
+                  <a:pt x="0" y="0"/>
+                </a:moveTo>
+                <a:cubicBezTo>
+                  <a:pt x="165980" y="669"/>
+                  <a:pt x="300049" y="14586"/>
+                  <a:pt x="299720" y="24976"/>
+                </a:cubicBezTo>
+                <a:cubicBezTo>
+                  <a:pt x="316360" y="250332"/>
+                  <a:pt x="300378" y="340204"/>
+                  <a:pt x="299720" y="613158"/>
+                </a:cubicBezTo>
+                <a:cubicBezTo>
+                  <a:pt x="299062" y="886112"/>
+                  <a:pt x="276655" y="1145329"/>
+                  <a:pt x="299720" y="1335017"/>
+                </a:cubicBezTo>
+                <a:cubicBezTo>
+                  <a:pt x="322785" y="1524705"/>
+                  <a:pt x="326579" y="1819880"/>
+                  <a:pt x="299720" y="1949935"/>
+                </a:cubicBezTo>
+                <a:cubicBezTo>
+                  <a:pt x="272861" y="2079990"/>
+                  <a:pt x="296991" y="2436381"/>
+                  <a:pt x="299720" y="2698530"/>
+                </a:cubicBezTo>
+                <a:cubicBezTo>
+                  <a:pt x="292549" y="2697706"/>
+                  <a:pt x="167992" y="2690214"/>
+                  <a:pt x="0" y="2723506"/>
+                </a:cubicBezTo>
+              </a:path>
+            </a:pathLst>
+          </a:custGeom>
+          <a:ln w="19050">
+            <a:solidFill>
+              <a:schemeClr val="accent4">
+                <a:lumMod val="75000"/>
+              </a:schemeClr>
+            </a:solidFill>
+            <a:extLst>
+              <a:ext uri="{C807C97D-BFC1-408E-A445-0C87EB9F89A2}">
+                <ask:lineSketchStyleProps xmlns:ask="http://schemas.microsoft.com/office/drawing/2018/sketchyshapes" sd="1219033472">
+                  <a:prstGeom prst="rightBracket">
+                    <a:avLst/>
+                  </a:prstGeom>
+                  <ask:type>
+                    <ask:lineSketchFreehand/>
+                  </ask:type>
+                </ask:lineSketchStyleProps>
+              </a:ext>
+            </a:extLst>
+          </a:ln>
+        </p:spPr>
+        <p:style>
+          <a:lnRef idx="1">
+            <a:schemeClr val="accent1"/>
+          </a:lnRef>
+          <a:fillRef idx="0">
+            <a:schemeClr val="accent1"/>
+          </a:fillRef>
+          <a:effectRef idx="0">
+            <a:schemeClr val="accent1"/>
+          </a:effectRef>
+          <a:fontRef idx="minor">
+            <a:schemeClr val="tx1"/>
+          </a:fontRef>
+        </p:style>
+        <p:txBody>
+          <a:bodyPr rtlCol="0" anchor="ctr"/>
+          <a:lstStyle/>
+          <a:p>
+            <a:pPr algn="ctr"/>
+            <a:endParaRPr lang="pl-PL"/>
+          </a:p>
+        </p:txBody>
+      </p:sp>
+      <p:cxnSp>
+        <p:nvCxnSpPr>
+          <p:cNvPr id="23" name="Łącznik prosty 22">
+            <a:extLst>
+              <a:ext uri="{FF2B5EF4-FFF2-40B4-BE49-F238E27FC236}">
+                <a16:creationId xmlns:a16="http://schemas.microsoft.com/office/drawing/2014/main" id="{423553D3-262A-4809-BB6E-8330DB2C23DA}"/>
+              </a:ext>
+            </a:extLst>
+          </p:cNvPr>
+          <p:cNvCxnSpPr>
+            <a:cxnSpLocks/>
+          </p:cNvCxnSpPr>
+          <p:nvPr/>
+        </p:nvCxnSpPr>
+        <p:spPr>
+          <a:xfrm flipH="1">
+            <a:off x="11340105" y="3001620"/>
+            <a:ext cx="299723" cy="660"/>
+          </a:xfrm>
+          <a:prstGeom prst="line">
+            <a:avLst/>
+          </a:prstGeom>
+          <a:ln w="19050">
+            <a:solidFill>
+              <a:schemeClr val="accent4">
+                <a:lumMod val="75000"/>
+              </a:schemeClr>
+            </a:solidFill>
+          </a:ln>
+        </p:spPr>
+        <p:style>
+          <a:lnRef idx="1">
+            <a:schemeClr val="accent1"/>
+          </a:lnRef>
+          <a:fillRef idx="0">
+            <a:schemeClr val="accent1"/>
+          </a:fillRef>
+          <a:effectRef idx="0">
+            <a:schemeClr val="accent1"/>
+          </a:effectRef>
+          <a:fontRef idx="minor">
+            <a:schemeClr val="tx1"/>
+          </a:fontRef>
+        </p:style>
+      </p:cxnSp>
     </p:spTree>
     <p:extLst>
       <p:ext uri="{BB962C8B-B14F-4D97-AF65-F5344CB8AC3E}">
@@ -9911,7 +11297,7 @@
         </p:blipFill>
         <p:spPr>
           <a:xfrm>
-            <a:off x="2667828" y="1040385"/>
+            <a:off x="3332021" y="1040385"/>
             <a:ext cx="6772217" cy="5729681"/>
           </a:xfrm>
           <a:prstGeom prst="rect">
@@ -9919,6 +11305,1666 @@
           </a:prstGeom>
         </p:spPr>
       </p:pic>
+      <p:sp>
+        <p:nvSpPr>
+          <p:cNvPr id="3" name="Nawias klamrowy otwierający 2">
+            <a:extLst>
+              <a:ext uri="{FF2B5EF4-FFF2-40B4-BE49-F238E27FC236}">
+                <a16:creationId xmlns:a16="http://schemas.microsoft.com/office/drawing/2014/main" id="{FC367859-9358-4645-AC01-955297F7C24B}"/>
+              </a:ext>
+            </a:extLst>
+          </p:cNvPr>
+          <p:cNvSpPr/>
+          <p:nvPr/>
+        </p:nvSpPr>
+        <p:spPr>
+          <a:xfrm>
+            <a:off x="3184479" y="3455988"/>
+            <a:ext cx="727881" cy="2444394"/>
+          </a:xfrm>
+          <a:custGeom>
+            <a:avLst/>
+            <a:gdLst>
+              <a:gd name="connsiteX0" fmla="*/ 727881 w 727881"/>
+              <a:gd name="connsiteY0" fmla="*/ 2444394 h 2444394"/>
+              <a:gd name="connsiteX1" fmla="*/ 363940 w 727881"/>
+              <a:gd name="connsiteY1" fmla="*/ 2383740 h 2444394"/>
+              <a:gd name="connsiteX2" fmla="*/ 363941 w 727881"/>
+              <a:gd name="connsiteY2" fmla="*/ 1273856 h 2444394"/>
+              <a:gd name="connsiteX3" fmla="*/ 0 w 727881"/>
+              <a:gd name="connsiteY3" fmla="*/ 1213202 h 2444394"/>
+              <a:gd name="connsiteX4" fmla="*/ 363941 w 727881"/>
+              <a:gd name="connsiteY4" fmla="*/ 1152548 h 2444394"/>
+              <a:gd name="connsiteX5" fmla="*/ 363941 w 727881"/>
+              <a:gd name="connsiteY5" fmla="*/ 60654 h 2444394"/>
+              <a:gd name="connsiteX6" fmla="*/ 727882 w 727881"/>
+              <a:gd name="connsiteY6" fmla="*/ 0 h 2444394"/>
+              <a:gd name="connsiteX7" fmla="*/ 727881 w 727881"/>
+              <a:gd name="connsiteY7" fmla="*/ 2444394 h 2444394"/>
+              <a:gd name="connsiteX0" fmla="*/ 727881 w 727881"/>
+              <a:gd name="connsiteY0" fmla="*/ 2444394 h 2444394"/>
+              <a:gd name="connsiteX1" fmla="*/ 363940 w 727881"/>
+              <a:gd name="connsiteY1" fmla="*/ 2383740 h 2444394"/>
+              <a:gd name="connsiteX2" fmla="*/ 363941 w 727881"/>
+              <a:gd name="connsiteY2" fmla="*/ 1273856 h 2444394"/>
+              <a:gd name="connsiteX3" fmla="*/ 0 w 727881"/>
+              <a:gd name="connsiteY3" fmla="*/ 1213202 h 2444394"/>
+              <a:gd name="connsiteX4" fmla="*/ 363941 w 727881"/>
+              <a:gd name="connsiteY4" fmla="*/ 1152548 h 2444394"/>
+              <a:gd name="connsiteX5" fmla="*/ 363941 w 727881"/>
+              <a:gd name="connsiteY5" fmla="*/ 60654 h 2444394"/>
+              <a:gd name="connsiteX6" fmla="*/ 727882 w 727881"/>
+              <a:gd name="connsiteY6" fmla="*/ 0 h 2444394"/>
+            </a:gdLst>
+            <a:ahLst/>
+            <a:cxnLst>
+              <a:cxn ang="0">
+                <a:pos x="connsiteX0" y="connsiteY0"/>
+              </a:cxn>
+              <a:cxn ang="0">
+                <a:pos x="connsiteX1" y="connsiteY1"/>
+              </a:cxn>
+              <a:cxn ang="0">
+                <a:pos x="connsiteX2" y="connsiteY2"/>
+              </a:cxn>
+              <a:cxn ang="0">
+                <a:pos x="connsiteX3" y="connsiteY3"/>
+              </a:cxn>
+              <a:cxn ang="0">
+                <a:pos x="connsiteX4" y="connsiteY4"/>
+              </a:cxn>
+              <a:cxn ang="0">
+                <a:pos x="connsiteX5" y="connsiteY5"/>
+              </a:cxn>
+              <a:cxn ang="0">
+                <a:pos x="connsiteX6" y="connsiteY6"/>
+              </a:cxn>
+            </a:cxnLst>
+            <a:rect l="l" t="t" r="r" b="b"/>
+            <a:pathLst>
+              <a:path w="727881" h="2444394" stroke="0" extrusionOk="0">
+                <a:moveTo>
+                  <a:pt x="727881" y="2444394"/>
+                </a:moveTo>
+                <a:cubicBezTo>
+                  <a:pt x="526962" y="2444931"/>
+                  <a:pt x="362992" y="2421950"/>
+                  <a:pt x="363940" y="2383740"/>
+                </a:cubicBezTo>
+                <a:cubicBezTo>
+                  <a:pt x="355493" y="2020360"/>
+                  <a:pt x="348785" y="1596238"/>
+                  <a:pt x="363941" y="1273856"/>
+                </a:cubicBezTo>
+                <a:cubicBezTo>
+                  <a:pt x="380032" y="1230702"/>
+                  <a:pt x="198827" y="1212170"/>
+                  <a:pt x="0" y="1213202"/>
+                </a:cubicBezTo>
+                <a:cubicBezTo>
+                  <a:pt x="202982" y="1215444"/>
+                  <a:pt x="365850" y="1186981"/>
+                  <a:pt x="363941" y="1152548"/>
+                </a:cubicBezTo>
+                <a:cubicBezTo>
+                  <a:pt x="317487" y="804040"/>
+                  <a:pt x="267125" y="482562"/>
+                  <a:pt x="363941" y="60654"/>
+                </a:cubicBezTo>
+                <a:cubicBezTo>
+                  <a:pt x="351245" y="37144"/>
+                  <a:pt x="549043" y="18522"/>
+                  <a:pt x="727882" y="0"/>
+                </a:cubicBezTo>
+                <a:cubicBezTo>
+                  <a:pt x="714387" y="833050"/>
+                  <a:pt x="735725" y="1640623"/>
+                  <a:pt x="727881" y="2444394"/>
+                </a:cubicBezTo>
+                <a:close/>
+              </a:path>
+              <a:path w="727881" h="2444394" fill="none" extrusionOk="0">
+                <a:moveTo>
+                  <a:pt x="727881" y="2444394"/>
+                </a:moveTo>
+                <a:cubicBezTo>
+                  <a:pt x="527336" y="2446845"/>
+                  <a:pt x="367781" y="2414521"/>
+                  <a:pt x="363940" y="2383740"/>
+                </a:cubicBezTo>
+                <a:cubicBezTo>
+                  <a:pt x="378616" y="2006181"/>
+                  <a:pt x="303104" y="1650913"/>
+                  <a:pt x="363941" y="1273856"/>
+                </a:cubicBezTo>
+                <a:cubicBezTo>
+                  <a:pt x="374899" y="1251325"/>
+                  <a:pt x="207837" y="1205321"/>
+                  <a:pt x="0" y="1213202"/>
+                </a:cubicBezTo>
+                <a:cubicBezTo>
+                  <a:pt x="203043" y="1213587"/>
+                  <a:pt x="359797" y="1187719"/>
+                  <a:pt x="363941" y="1152548"/>
+                </a:cubicBezTo>
+                <a:cubicBezTo>
+                  <a:pt x="347894" y="980493"/>
+                  <a:pt x="316328" y="473843"/>
+                  <a:pt x="363941" y="60654"/>
+                </a:cubicBezTo>
+                <a:cubicBezTo>
+                  <a:pt x="332944" y="33358"/>
+                  <a:pt x="539082" y="-25389"/>
+                  <a:pt x="727882" y="0"/>
+                </a:cubicBezTo>
+              </a:path>
+            </a:pathLst>
+          </a:custGeom>
+          <a:ln w="19050">
+            <a:solidFill>
+              <a:schemeClr val="bg2">
+                <a:lumMod val="25000"/>
+              </a:schemeClr>
+            </a:solidFill>
+            <a:extLst>
+              <a:ext uri="{C807C97D-BFC1-408E-A445-0C87EB9F89A2}">
+                <ask:lineSketchStyleProps xmlns:ask="http://schemas.microsoft.com/office/drawing/2018/sketchyshapes" sd="431491757">
+                  <a:prstGeom prst="leftBrace">
+                    <a:avLst>
+                      <a:gd name="adj1" fmla="val 8333"/>
+                      <a:gd name="adj2" fmla="val 49632"/>
+                    </a:avLst>
+                  </a:prstGeom>
+                  <ask:type>
+                    <ask:lineSketchCurved/>
+                  </ask:type>
+                </ask:lineSketchStyleProps>
+              </a:ext>
+            </a:extLst>
+          </a:ln>
+        </p:spPr>
+        <p:style>
+          <a:lnRef idx="1">
+            <a:schemeClr val="accent1"/>
+          </a:lnRef>
+          <a:fillRef idx="0">
+            <a:schemeClr val="accent1"/>
+          </a:fillRef>
+          <a:effectRef idx="0">
+            <a:schemeClr val="accent1"/>
+          </a:effectRef>
+          <a:fontRef idx="minor">
+            <a:schemeClr val="tx1"/>
+          </a:fontRef>
+        </p:style>
+        <p:txBody>
+          <a:bodyPr rtlCol="0" anchor="ctr"/>
+          <a:lstStyle/>
+          <a:p>
+            <a:pPr algn="ctr"/>
+            <a:endParaRPr lang="pl-PL"/>
+          </a:p>
+        </p:txBody>
+      </p:sp>
+      <p:sp>
+        <p:nvSpPr>
+          <p:cNvPr id="4" name="pole tekstowe 3">
+            <a:extLst>
+              <a:ext uri="{FF2B5EF4-FFF2-40B4-BE49-F238E27FC236}">
+                <a16:creationId xmlns:a16="http://schemas.microsoft.com/office/drawing/2014/main" id="{262AAFC0-7D9D-41D5-B232-F7FEF21A0F86}"/>
+              </a:ext>
+            </a:extLst>
+          </p:cNvPr>
+          <p:cNvSpPr txBox="1"/>
+          <p:nvPr/>
+        </p:nvSpPr>
+        <p:spPr>
+          <a:xfrm>
+            <a:off x="750627" y="3840097"/>
+            <a:ext cx="2547582" cy="1815882"/>
+          </a:xfrm>
+          <a:prstGeom prst="rect">
+            <a:avLst/>
+          </a:prstGeom>
+          <a:noFill/>
+        </p:spPr>
+        <p:txBody>
+          <a:bodyPr wrap="square" rtlCol="0">
+            <a:spAutoFit/>
+          </a:bodyPr>
+          <a:lstStyle/>
+          <a:p>
+            <a:r>
+              <a:rPr lang="pl-PL" sz="1400" b="1" dirty="0">
+                <a:solidFill>
+                  <a:schemeClr val="bg2">
+                    <a:lumMod val="25000"/>
+                  </a:schemeClr>
+                </a:solidFill>
+              </a:rPr>
+              <a:t>Wartości statystyczne </a:t>
+            </a:r>
+            <a:r>
+              <a:rPr lang="pl-PL" sz="1400" dirty="0">
+                <a:solidFill>
+                  <a:schemeClr val="bg2">
+                    <a:lumMod val="25000"/>
+                  </a:schemeClr>
+                </a:solidFill>
+              </a:rPr>
+              <a:t>(obliczone przez </a:t>
+            </a:r>
+            <a:r>
+              <a:rPr lang="pl-PL" sz="1400" dirty="0" err="1">
+                <a:solidFill>
+                  <a:schemeClr val="bg2">
+                    <a:lumMod val="25000"/>
+                  </a:schemeClr>
+                </a:solidFill>
+              </a:rPr>
+              <a:t>MongoDB</a:t>
+            </a:r>
+            <a:r>
+              <a:rPr lang="pl-PL" sz="1400" dirty="0">
+                <a:solidFill>
+                  <a:schemeClr val="bg2">
+                    <a:lumMod val="25000"/>
+                  </a:schemeClr>
+                </a:solidFill>
+              </a:rPr>
+              <a:t>):</a:t>
+            </a:r>
+          </a:p>
+          <a:p>
+            <a:pPr marL="268288" indent="-177800">
+              <a:buFont typeface="Wingdings" panose="05000000000000000000" pitchFamily="2" charset="2"/>
+              <a:buChar char="§"/>
+              <a:tabLst>
+                <a:tab pos="268288" algn="l"/>
+              </a:tabLst>
+            </a:pPr>
+            <a:r>
+              <a:rPr lang="pl-PL" sz="1400" dirty="0">
+                <a:solidFill>
+                  <a:schemeClr val="bg2">
+                    <a:lumMod val="25000"/>
+                  </a:schemeClr>
+                </a:solidFill>
+              </a:rPr>
+              <a:t>minimum</a:t>
+            </a:r>
+          </a:p>
+          <a:p>
+            <a:pPr marL="268288" indent="-177800">
+              <a:buFont typeface="Wingdings" panose="05000000000000000000" pitchFamily="2" charset="2"/>
+              <a:buChar char="§"/>
+              <a:tabLst>
+                <a:tab pos="268288" algn="l"/>
+              </a:tabLst>
+            </a:pPr>
+            <a:r>
+              <a:rPr lang="pl-PL" sz="1400" dirty="0">
+                <a:solidFill>
+                  <a:schemeClr val="bg2">
+                    <a:lumMod val="25000"/>
+                  </a:schemeClr>
+                </a:solidFill>
+              </a:rPr>
+              <a:t>maksimum</a:t>
+            </a:r>
+          </a:p>
+          <a:p>
+            <a:pPr marL="268288" indent="-177800">
+              <a:buFont typeface="Wingdings" panose="05000000000000000000" pitchFamily="2" charset="2"/>
+              <a:buChar char="§"/>
+              <a:tabLst>
+                <a:tab pos="268288" algn="l"/>
+              </a:tabLst>
+            </a:pPr>
+            <a:r>
+              <a:rPr lang="pl-PL" sz="1400" dirty="0">
+                <a:solidFill>
+                  <a:schemeClr val="bg2">
+                    <a:lumMod val="25000"/>
+                  </a:schemeClr>
+                </a:solidFill>
+              </a:rPr>
+              <a:t>średniej arytmetycznej</a:t>
+            </a:r>
+          </a:p>
+          <a:p>
+            <a:pPr marL="268288" indent="-177800">
+              <a:buFont typeface="Wingdings" panose="05000000000000000000" pitchFamily="2" charset="2"/>
+              <a:buChar char="§"/>
+              <a:tabLst>
+                <a:tab pos="268288" algn="l"/>
+              </a:tabLst>
+            </a:pPr>
+            <a:r>
+              <a:rPr lang="pl-PL" sz="1400" dirty="0">
+                <a:solidFill>
+                  <a:schemeClr val="bg2">
+                    <a:lumMod val="25000"/>
+                  </a:schemeClr>
+                </a:solidFill>
+              </a:rPr>
+              <a:t>odchylenie standardowe od średniej</a:t>
+            </a:r>
+          </a:p>
+          <a:p>
+            <a:endParaRPr lang="pl-PL" sz="1400" dirty="0">
+              <a:solidFill>
+                <a:schemeClr val="bg2">
+                  <a:lumMod val="25000"/>
+                </a:schemeClr>
+              </a:solidFill>
+            </a:endParaRPr>
+          </a:p>
+        </p:txBody>
+      </p:sp>
+      <p:sp>
+        <p:nvSpPr>
+          <p:cNvPr id="8" name="Nawias klamrowy otwierający 7">
+            <a:extLst>
+              <a:ext uri="{FF2B5EF4-FFF2-40B4-BE49-F238E27FC236}">
+                <a16:creationId xmlns:a16="http://schemas.microsoft.com/office/drawing/2014/main" id="{7D3B5D93-87A0-4BF8-A386-15EB86385B62}"/>
+              </a:ext>
+            </a:extLst>
+          </p:cNvPr>
+          <p:cNvSpPr/>
+          <p:nvPr/>
+        </p:nvSpPr>
+        <p:spPr>
+          <a:xfrm>
+            <a:off x="3184479" y="1960845"/>
+            <a:ext cx="727881" cy="194979"/>
+          </a:xfrm>
+          <a:custGeom>
+            <a:avLst/>
+            <a:gdLst>
+              <a:gd name="connsiteX0" fmla="*/ 727881 w 727881"/>
+              <a:gd name="connsiteY0" fmla="*/ 194979 h 194979"/>
+              <a:gd name="connsiteX1" fmla="*/ 363940 w 727881"/>
+              <a:gd name="connsiteY1" fmla="*/ 178731 h 194979"/>
+              <a:gd name="connsiteX2" fmla="*/ 363941 w 727881"/>
+              <a:gd name="connsiteY2" fmla="*/ 113020 h 194979"/>
+              <a:gd name="connsiteX3" fmla="*/ 0 w 727881"/>
+              <a:gd name="connsiteY3" fmla="*/ 96772 h 194979"/>
+              <a:gd name="connsiteX4" fmla="*/ 363941 w 727881"/>
+              <a:gd name="connsiteY4" fmla="*/ 80524 h 194979"/>
+              <a:gd name="connsiteX5" fmla="*/ 363941 w 727881"/>
+              <a:gd name="connsiteY5" fmla="*/ 16248 h 194979"/>
+              <a:gd name="connsiteX6" fmla="*/ 727882 w 727881"/>
+              <a:gd name="connsiteY6" fmla="*/ 0 h 194979"/>
+              <a:gd name="connsiteX7" fmla="*/ 727881 w 727881"/>
+              <a:gd name="connsiteY7" fmla="*/ 194979 h 194979"/>
+              <a:gd name="connsiteX0" fmla="*/ 727881 w 727881"/>
+              <a:gd name="connsiteY0" fmla="*/ 194979 h 194979"/>
+              <a:gd name="connsiteX1" fmla="*/ 363940 w 727881"/>
+              <a:gd name="connsiteY1" fmla="*/ 178731 h 194979"/>
+              <a:gd name="connsiteX2" fmla="*/ 363941 w 727881"/>
+              <a:gd name="connsiteY2" fmla="*/ 113020 h 194979"/>
+              <a:gd name="connsiteX3" fmla="*/ 0 w 727881"/>
+              <a:gd name="connsiteY3" fmla="*/ 96772 h 194979"/>
+              <a:gd name="connsiteX4" fmla="*/ 363941 w 727881"/>
+              <a:gd name="connsiteY4" fmla="*/ 80524 h 194979"/>
+              <a:gd name="connsiteX5" fmla="*/ 363941 w 727881"/>
+              <a:gd name="connsiteY5" fmla="*/ 16248 h 194979"/>
+              <a:gd name="connsiteX6" fmla="*/ 727882 w 727881"/>
+              <a:gd name="connsiteY6" fmla="*/ 0 h 194979"/>
+            </a:gdLst>
+            <a:ahLst/>
+            <a:cxnLst>
+              <a:cxn ang="0">
+                <a:pos x="connsiteX0" y="connsiteY0"/>
+              </a:cxn>
+              <a:cxn ang="0">
+                <a:pos x="connsiteX1" y="connsiteY1"/>
+              </a:cxn>
+              <a:cxn ang="0">
+                <a:pos x="connsiteX2" y="connsiteY2"/>
+              </a:cxn>
+              <a:cxn ang="0">
+                <a:pos x="connsiteX3" y="connsiteY3"/>
+              </a:cxn>
+              <a:cxn ang="0">
+                <a:pos x="connsiteX4" y="connsiteY4"/>
+              </a:cxn>
+              <a:cxn ang="0">
+                <a:pos x="connsiteX5" y="connsiteY5"/>
+              </a:cxn>
+              <a:cxn ang="0">
+                <a:pos x="connsiteX6" y="connsiteY6"/>
+              </a:cxn>
+            </a:cxnLst>
+            <a:rect l="l" t="t" r="r" b="b"/>
+            <a:pathLst>
+              <a:path w="727881" h="194979" stroke="0" extrusionOk="0">
+                <a:moveTo>
+                  <a:pt x="727881" y="194979"/>
+                </a:moveTo>
+                <a:cubicBezTo>
+                  <a:pt x="527098" y="196424"/>
+                  <a:pt x="363709" y="188854"/>
+                  <a:pt x="363940" y="178731"/>
+                </a:cubicBezTo>
+                <a:cubicBezTo>
+                  <a:pt x="363679" y="157030"/>
+                  <a:pt x="363578" y="133786"/>
+                  <a:pt x="363941" y="113020"/>
+                </a:cubicBezTo>
+                <a:cubicBezTo>
+                  <a:pt x="378072" y="95566"/>
+                  <a:pt x="184168" y="88776"/>
+                  <a:pt x="0" y="96772"/>
+                </a:cubicBezTo>
+                <a:cubicBezTo>
+                  <a:pt x="201373" y="97195"/>
+                  <a:pt x="364337" y="89692"/>
+                  <a:pt x="363941" y="80524"/>
+                </a:cubicBezTo>
+                <a:cubicBezTo>
+                  <a:pt x="363276" y="73203"/>
+                  <a:pt x="362159" y="42038"/>
+                  <a:pt x="363941" y="16248"/>
+                </a:cubicBezTo>
+                <a:cubicBezTo>
+                  <a:pt x="357737" y="12155"/>
+                  <a:pt x="535654" y="7331"/>
+                  <a:pt x="727882" y="0"/>
+                </a:cubicBezTo>
+                <a:cubicBezTo>
+                  <a:pt x="725308" y="68474"/>
+                  <a:pt x="729340" y="132037"/>
+                  <a:pt x="727881" y="194979"/>
+                </a:cubicBezTo>
+                <a:close/>
+              </a:path>
+              <a:path w="727881" h="194979" fill="none" extrusionOk="0">
+                <a:moveTo>
+                  <a:pt x="727881" y="194979"/>
+                </a:moveTo>
+                <a:cubicBezTo>
+                  <a:pt x="526993" y="195579"/>
+                  <a:pt x="364987" y="186965"/>
+                  <a:pt x="363940" y="178731"/>
+                </a:cubicBezTo>
+                <a:cubicBezTo>
+                  <a:pt x="367011" y="155237"/>
+                  <a:pt x="360174" y="135363"/>
+                  <a:pt x="363941" y="113020"/>
+                </a:cubicBezTo>
+                <a:cubicBezTo>
+                  <a:pt x="366740" y="106848"/>
+                  <a:pt x="206074" y="90922"/>
+                  <a:pt x="0" y="96772"/>
+                </a:cubicBezTo>
+                <a:cubicBezTo>
+                  <a:pt x="202226" y="97003"/>
+                  <a:pt x="363597" y="89637"/>
+                  <a:pt x="363941" y="80524"/>
+                </a:cubicBezTo>
+                <a:cubicBezTo>
+                  <a:pt x="359106" y="50113"/>
+                  <a:pt x="368939" y="29266"/>
+                  <a:pt x="363941" y="16248"/>
+                </a:cubicBezTo>
+                <a:cubicBezTo>
+                  <a:pt x="361319" y="7799"/>
+                  <a:pt x="535946" y="-18863"/>
+                  <a:pt x="727882" y="0"/>
+                </a:cubicBezTo>
+              </a:path>
+            </a:pathLst>
+          </a:custGeom>
+          <a:ln w="19050">
+            <a:solidFill>
+              <a:srgbClr val="92D050"/>
+            </a:solidFill>
+            <a:extLst>
+              <a:ext uri="{C807C97D-BFC1-408E-A445-0C87EB9F89A2}">
+                <ask:lineSketchStyleProps xmlns:ask="http://schemas.microsoft.com/office/drawing/2018/sketchyshapes" sd="431491757">
+                  <a:prstGeom prst="leftBrace">
+                    <a:avLst>
+                      <a:gd name="adj1" fmla="val 8333"/>
+                      <a:gd name="adj2" fmla="val 49632"/>
+                    </a:avLst>
+                  </a:prstGeom>
+                  <ask:type>
+                    <ask:lineSketchCurved/>
+                  </ask:type>
+                </ask:lineSketchStyleProps>
+              </a:ext>
+            </a:extLst>
+          </a:ln>
+        </p:spPr>
+        <p:style>
+          <a:lnRef idx="1">
+            <a:schemeClr val="accent1"/>
+          </a:lnRef>
+          <a:fillRef idx="0">
+            <a:schemeClr val="accent1"/>
+          </a:fillRef>
+          <a:effectRef idx="0">
+            <a:schemeClr val="accent1"/>
+          </a:effectRef>
+          <a:fontRef idx="minor">
+            <a:schemeClr val="tx1"/>
+          </a:fontRef>
+        </p:style>
+        <p:txBody>
+          <a:bodyPr rtlCol="0" anchor="ctr"/>
+          <a:lstStyle/>
+          <a:p>
+            <a:pPr algn="ctr"/>
+            <a:endParaRPr lang="pl-PL" dirty="0">
+              <a:solidFill>
+                <a:schemeClr val="accent3">
+                  <a:lumMod val="75000"/>
+                </a:schemeClr>
+              </a:solidFill>
+            </a:endParaRPr>
+          </a:p>
+        </p:txBody>
+      </p:sp>
+      <p:sp>
+        <p:nvSpPr>
+          <p:cNvPr id="9" name="pole tekstowe 8">
+            <a:extLst>
+              <a:ext uri="{FF2B5EF4-FFF2-40B4-BE49-F238E27FC236}">
+                <a16:creationId xmlns:a16="http://schemas.microsoft.com/office/drawing/2014/main" id="{6EE4F024-A3A3-473C-91C7-73018B391239}"/>
+              </a:ext>
+            </a:extLst>
+          </p:cNvPr>
+          <p:cNvSpPr txBox="1"/>
+          <p:nvPr/>
+        </p:nvSpPr>
+        <p:spPr>
+          <a:xfrm>
+            <a:off x="693761" y="2880653"/>
+            <a:ext cx="2547582" cy="738664"/>
+          </a:xfrm>
+          <a:prstGeom prst="rect">
+            <a:avLst/>
+          </a:prstGeom>
+          <a:noFill/>
+        </p:spPr>
+        <p:txBody>
+          <a:bodyPr wrap="square" rtlCol="0">
+            <a:spAutoFit/>
+          </a:bodyPr>
+          <a:lstStyle/>
+          <a:p>
+            <a:pPr algn="ctr"/>
+            <a:r>
+              <a:rPr lang="pl-PL" sz="1400" b="1" dirty="0">
+                <a:solidFill>
+                  <a:schemeClr val="accent3">
+                    <a:lumMod val="75000"/>
+                  </a:schemeClr>
+                </a:solidFill>
+              </a:rPr>
+              <a:t>Nazwy stacji </a:t>
+            </a:r>
+            <a:r>
+              <a:rPr lang="pl-PL" sz="1400" dirty="0">
+                <a:solidFill>
+                  <a:schemeClr val="accent3">
+                    <a:lumMod val="75000"/>
+                  </a:schemeClr>
+                </a:solidFill>
+              </a:rPr>
+              <a:t>(początkowej i końcowej) </a:t>
+            </a:r>
+            <a:r>
+              <a:rPr lang="pl-PL" sz="1400" b="1" dirty="0">
+                <a:solidFill>
+                  <a:schemeClr val="accent3">
+                    <a:lumMod val="75000"/>
+                  </a:schemeClr>
+                </a:solidFill>
+              </a:rPr>
+              <a:t>z relacyjnej tabeli </a:t>
+            </a:r>
+            <a:r>
+              <a:rPr lang="pl-PL" sz="1400" b="1" dirty="0" err="1">
+                <a:solidFill>
+                  <a:schemeClr val="accent3">
+                    <a:lumMod val="75000"/>
+                  </a:schemeClr>
+                </a:solidFill>
+              </a:rPr>
+              <a:t>Stations</a:t>
+            </a:r>
+            <a:endParaRPr lang="pl-PL" sz="1400" dirty="0">
+              <a:solidFill>
+                <a:schemeClr val="accent3">
+                  <a:lumMod val="75000"/>
+                </a:schemeClr>
+              </a:solidFill>
+            </a:endParaRPr>
+          </a:p>
+        </p:txBody>
+      </p:sp>
+      <p:sp>
+        <p:nvSpPr>
+          <p:cNvPr id="10" name="Nawias klamrowy otwierający 9">
+            <a:extLst>
+              <a:ext uri="{FF2B5EF4-FFF2-40B4-BE49-F238E27FC236}">
+                <a16:creationId xmlns:a16="http://schemas.microsoft.com/office/drawing/2014/main" id="{0DB03991-F849-4966-BFAC-0D11D39CF4A4}"/>
+              </a:ext>
+            </a:extLst>
+          </p:cNvPr>
+          <p:cNvSpPr/>
+          <p:nvPr/>
+        </p:nvSpPr>
+        <p:spPr>
+          <a:xfrm>
+            <a:off x="3174384" y="6067552"/>
+            <a:ext cx="727881" cy="201486"/>
+          </a:xfrm>
+          <a:custGeom>
+            <a:avLst/>
+            <a:gdLst>
+              <a:gd name="connsiteX0" fmla="*/ 727881 w 727881"/>
+              <a:gd name="connsiteY0" fmla="*/ 201486 h 201486"/>
+              <a:gd name="connsiteX1" fmla="*/ 363940 w 727881"/>
+              <a:gd name="connsiteY1" fmla="*/ 184696 h 201486"/>
+              <a:gd name="connsiteX2" fmla="*/ 363941 w 727881"/>
+              <a:gd name="connsiteY2" fmla="*/ 116791 h 201486"/>
+              <a:gd name="connsiteX3" fmla="*/ 0 w 727881"/>
+              <a:gd name="connsiteY3" fmla="*/ 100001 h 201486"/>
+              <a:gd name="connsiteX4" fmla="*/ 363941 w 727881"/>
+              <a:gd name="connsiteY4" fmla="*/ 83211 h 201486"/>
+              <a:gd name="connsiteX5" fmla="*/ 363941 w 727881"/>
+              <a:gd name="connsiteY5" fmla="*/ 16790 h 201486"/>
+              <a:gd name="connsiteX6" fmla="*/ 727882 w 727881"/>
+              <a:gd name="connsiteY6" fmla="*/ 0 h 201486"/>
+              <a:gd name="connsiteX7" fmla="*/ 727881 w 727881"/>
+              <a:gd name="connsiteY7" fmla="*/ 201486 h 201486"/>
+              <a:gd name="connsiteX0" fmla="*/ 727881 w 727881"/>
+              <a:gd name="connsiteY0" fmla="*/ 201486 h 201486"/>
+              <a:gd name="connsiteX1" fmla="*/ 363940 w 727881"/>
+              <a:gd name="connsiteY1" fmla="*/ 184696 h 201486"/>
+              <a:gd name="connsiteX2" fmla="*/ 363941 w 727881"/>
+              <a:gd name="connsiteY2" fmla="*/ 116791 h 201486"/>
+              <a:gd name="connsiteX3" fmla="*/ 0 w 727881"/>
+              <a:gd name="connsiteY3" fmla="*/ 100001 h 201486"/>
+              <a:gd name="connsiteX4" fmla="*/ 363941 w 727881"/>
+              <a:gd name="connsiteY4" fmla="*/ 83211 h 201486"/>
+              <a:gd name="connsiteX5" fmla="*/ 363941 w 727881"/>
+              <a:gd name="connsiteY5" fmla="*/ 16790 h 201486"/>
+              <a:gd name="connsiteX6" fmla="*/ 727882 w 727881"/>
+              <a:gd name="connsiteY6" fmla="*/ 0 h 201486"/>
+            </a:gdLst>
+            <a:ahLst/>
+            <a:cxnLst>
+              <a:cxn ang="0">
+                <a:pos x="connsiteX0" y="connsiteY0"/>
+              </a:cxn>
+              <a:cxn ang="0">
+                <a:pos x="connsiteX1" y="connsiteY1"/>
+              </a:cxn>
+              <a:cxn ang="0">
+                <a:pos x="connsiteX2" y="connsiteY2"/>
+              </a:cxn>
+              <a:cxn ang="0">
+                <a:pos x="connsiteX3" y="connsiteY3"/>
+              </a:cxn>
+              <a:cxn ang="0">
+                <a:pos x="connsiteX4" y="connsiteY4"/>
+              </a:cxn>
+              <a:cxn ang="0">
+                <a:pos x="connsiteX5" y="connsiteY5"/>
+              </a:cxn>
+              <a:cxn ang="0">
+                <a:pos x="connsiteX6" y="connsiteY6"/>
+              </a:cxn>
+            </a:cxnLst>
+            <a:rect l="l" t="t" r="r" b="b"/>
+            <a:pathLst>
+              <a:path w="727881" h="201486" stroke="0" extrusionOk="0">
+                <a:moveTo>
+                  <a:pt x="727881" y="201486"/>
+                </a:moveTo>
+                <a:cubicBezTo>
+                  <a:pt x="527019" y="202401"/>
+                  <a:pt x="363649" y="195415"/>
+                  <a:pt x="363940" y="184696"/>
+                </a:cubicBezTo>
+                <a:cubicBezTo>
+                  <a:pt x="363066" y="162742"/>
+                  <a:pt x="363352" y="137578"/>
+                  <a:pt x="363941" y="116791"/>
+                </a:cubicBezTo>
+                <a:cubicBezTo>
+                  <a:pt x="379473" y="98197"/>
+                  <a:pt x="181966" y="90959"/>
+                  <a:pt x="0" y="100001"/>
+                </a:cubicBezTo>
+                <a:cubicBezTo>
+                  <a:pt x="201619" y="100702"/>
+                  <a:pt x="365355" y="93176"/>
+                  <a:pt x="363941" y="83211"/>
+                </a:cubicBezTo>
+                <a:cubicBezTo>
+                  <a:pt x="361884" y="74074"/>
+                  <a:pt x="366288" y="41022"/>
+                  <a:pt x="363941" y="16790"/>
+                </a:cubicBezTo>
+                <a:cubicBezTo>
+                  <a:pt x="342790" y="24157"/>
+                  <a:pt x="541628" y="12325"/>
+                  <a:pt x="727882" y="0"/>
+                </a:cubicBezTo>
+                <a:cubicBezTo>
+                  <a:pt x="719964" y="77871"/>
+                  <a:pt x="731592" y="139541"/>
+                  <a:pt x="727881" y="201486"/>
+                </a:cubicBezTo>
+                <a:close/>
+              </a:path>
+              <a:path w="727881" h="201486" fill="none" extrusionOk="0">
+                <a:moveTo>
+                  <a:pt x="727881" y="201486"/>
+                </a:moveTo>
+                <a:cubicBezTo>
+                  <a:pt x="527170" y="203039"/>
+                  <a:pt x="364851" y="193325"/>
+                  <a:pt x="363940" y="184696"/>
+                </a:cubicBezTo>
+                <a:cubicBezTo>
+                  <a:pt x="366176" y="160904"/>
+                  <a:pt x="360929" y="139777"/>
+                  <a:pt x="363941" y="116791"/>
+                </a:cubicBezTo>
+                <a:cubicBezTo>
+                  <a:pt x="376904" y="120492"/>
+                  <a:pt x="220052" y="78041"/>
+                  <a:pt x="0" y="100001"/>
+                </a:cubicBezTo>
+                <a:cubicBezTo>
+                  <a:pt x="201136" y="100027"/>
+                  <a:pt x="363393" y="92705"/>
+                  <a:pt x="363941" y="83211"/>
+                </a:cubicBezTo>
+                <a:cubicBezTo>
+                  <a:pt x="361104" y="54158"/>
+                  <a:pt x="367682" y="25532"/>
+                  <a:pt x="363941" y="16790"/>
+                </a:cubicBezTo>
+                <a:cubicBezTo>
+                  <a:pt x="345963" y="11114"/>
+                  <a:pt x="534249" y="-15330"/>
+                  <a:pt x="727882" y="0"/>
+                </a:cubicBezTo>
+              </a:path>
+            </a:pathLst>
+          </a:custGeom>
+          <a:ln w="19050">
+            <a:solidFill>
+              <a:schemeClr val="accent6">
+                <a:lumMod val="75000"/>
+              </a:schemeClr>
+            </a:solidFill>
+            <a:extLst>
+              <a:ext uri="{C807C97D-BFC1-408E-A445-0C87EB9F89A2}">
+                <ask:lineSketchStyleProps xmlns:ask="http://schemas.microsoft.com/office/drawing/2018/sketchyshapes" sd="431491757">
+                  <a:prstGeom prst="leftBrace">
+                    <a:avLst>
+                      <a:gd name="adj1" fmla="val 8333"/>
+                      <a:gd name="adj2" fmla="val 49632"/>
+                    </a:avLst>
+                  </a:prstGeom>
+                  <ask:type>
+                    <ask:lineSketchCurved/>
+                  </ask:type>
+                </ask:lineSketchStyleProps>
+              </a:ext>
+            </a:extLst>
+          </a:ln>
+        </p:spPr>
+        <p:style>
+          <a:lnRef idx="1">
+            <a:schemeClr val="accent1"/>
+          </a:lnRef>
+          <a:fillRef idx="0">
+            <a:schemeClr val="accent1"/>
+          </a:fillRef>
+          <a:effectRef idx="0">
+            <a:schemeClr val="accent1"/>
+          </a:effectRef>
+          <a:fontRef idx="minor">
+            <a:schemeClr val="tx1"/>
+          </a:fontRef>
+        </p:style>
+        <p:txBody>
+          <a:bodyPr rtlCol="0" anchor="ctr"/>
+          <a:lstStyle/>
+          <a:p>
+            <a:pPr algn="ctr"/>
+            <a:endParaRPr lang="pl-PL">
+              <a:solidFill>
+                <a:schemeClr val="accent3">
+                  <a:lumMod val="75000"/>
+                </a:schemeClr>
+              </a:solidFill>
+            </a:endParaRPr>
+          </a:p>
+        </p:txBody>
+      </p:sp>
+      <p:sp>
+        <p:nvSpPr>
+          <p:cNvPr id="11" name="pole tekstowe 10">
+            <a:extLst>
+              <a:ext uri="{FF2B5EF4-FFF2-40B4-BE49-F238E27FC236}">
+                <a16:creationId xmlns:a16="http://schemas.microsoft.com/office/drawing/2014/main" id="{042E9783-CC04-4DF1-884C-25DB679313E4}"/>
+              </a:ext>
+            </a:extLst>
+          </p:cNvPr>
+          <p:cNvSpPr txBox="1"/>
+          <p:nvPr/>
+        </p:nvSpPr>
+        <p:spPr>
+          <a:xfrm>
+            <a:off x="750627" y="5881721"/>
+            <a:ext cx="2406851" cy="523220"/>
+          </a:xfrm>
+          <a:prstGeom prst="rect">
+            <a:avLst/>
+          </a:prstGeom>
+          <a:noFill/>
+        </p:spPr>
+        <p:txBody>
+          <a:bodyPr wrap="square" rtlCol="0">
+            <a:spAutoFit/>
+          </a:bodyPr>
+          <a:lstStyle/>
+          <a:p>
+            <a:pPr algn="ctr"/>
+            <a:r>
+              <a:rPr lang="pl-PL" sz="1400" b="1" dirty="0">
+                <a:solidFill>
+                  <a:schemeClr val="accent6">
+                    <a:lumMod val="75000"/>
+                  </a:schemeClr>
+                </a:solidFill>
+              </a:rPr>
+              <a:t>Ilość postojów obliczona na podstawie prędkości</a:t>
+            </a:r>
+          </a:p>
+        </p:txBody>
+      </p:sp>
+      <p:sp>
+        <p:nvSpPr>
+          <p:cNvPr id="13" name="pole tekstowe 12">
+            <a:extLst>
+              <a:ext uri="{FF2B5EF4-FFF2-40B4-BE49-F238E27FC236}">
+                <a16:creationId xmlns:a16="http://schemas.microsoft.com/office/drawing/2014/main" id="{E3B68F6F-333B-4864-AA96-A9DA6049E2E4}"/>
+              </a:ext>
+            </a:extLst>
+          </p:cNvPr>
+          <p:cNvSpPr txBox="1"/>
+          <p:nvPr/>
+        </p:nvSpPr>
+        <p:spPr>
+          <a:xfrm>
+            <a:off x="10194917" y="1969559"/>
+            <a:ext cx="1956444" cy="1384995"/>
+          </a:xfrm>
+          <a:prstGeom prst="rect">
+            <a:avLst/>
+          </a:prstGeom>
+          <a:noFill/>
+        </p:spPr>
+        <p:txBody>
+          <a:bodyPr wrap="square" rtlCol="0">
+            <a:spAutoFit/>
+          </a:bodyPr>
+          <a:lstStyle/>
+          <a:p>
+            <a:pPr marL="180975" indent="-180975">
+              <a:buFont typeface="Wingdings" panose="05000000000000000000" pitchFamily="2" charset="2"/>
+              <a:buChar char="§"/>
+            </a:pPr>
+            <a:r>
+              <a:rPr lang="pl-PL" sz="1400" b="1" dirty="0">
+                <a:solidFill>
+                  <a:schemeClr val="accent4">
+                    <a:lumMod val="75000"/>
+                  </a:schemeClr>
+                </a:solidFill>
+              </a:rPr>
+              <a:t>Pole z indeksem </a:t>
+            </a:r>
+            <a:r>
+              <a:rPr lang="pl-PL" sz="1400" dirty="0">
+                <a:solidFill>
+                  <a:schemeClr val="accent4">
+                    <a:lumMod val="75000"/>
+                  </a:schemeClr>
+                </a:solidFill>
+              </a:rPr>
+              <a:t>do przyspieszenia wyszukiwania i edycji danych</a:t>
+            </a:r>
+            <a:endParaRPr lang="pl-PL" sz="1400" b="1" dirty="0">
+              <a:solidFill>
+                <a:schemeClr val="accent4">
+                  <a:lumMod val="75000"/>
+                </a:schemeClr>
+              </a:solidFill>
+            </a:endParaRPr>
+          </a:p>
+          <a:p>
+            <a:pPr marL="180975" indent="-180975">
+              <a:buFont typeface="Wingdings" panose="05000000000000000000" pitchFamily="2" charset="2"/>
+              <a:buChar char="§"/>
+            </a:pPr>
+            <a:r>
+              <a:rPr lang="pl-PL" sz="1400" b="1" dirty="0">
+                <a:solidFill>
+                  <a:schemeClr val="accent4">
+                    <a:lumMod val="75000"/>
+                  </a:schemeClr>
+                </a:solidFill>
+              </a:rPr>
+              <a:t>64 bitowa wartość </a:t>
+            </a:r>
+            <a:r>
+              <a:rPr lang="pl-PL" sz="1400" b="1" dirty="0" err="1">
+                <a:solidFill>
+                  <a:schemeClr val="accent4">
+                    <a:lumMod val="75000"/>
+                  </a:schemeClr>
+                </a:solidFill>
+              </a:rPr>
+              <a:t>MurmurHash</a:t>
+            </a:r>
+            <a:endParaRPr lang="pl-PL" sz="1400" b="1" dirty="0">
+              <a:solidFill>
+                <a:schemeClr val="accent4">
+                  <a:lumMod val="75000"/>
+                </a:schemeClr>
+              </a:solidFill>
+            </a:endParaRPr>
+          </a:p>
+        </p:txBody>
+      </p:sp>
+      <p:sp>
+        <p:nvSpPr>
+          <p:cNvPr id="14" name="Nawias klamrowy otwierający 13">
+            <a:extLst>
+              <a:ext uri="{FF2B5EF4-FFF2-40B4-BE49-F238E27FC236}">
+                <a16:creationId xmlns:a16="http://schemas.microsoft.com/office/drawing/2014/main" id="{C5EC659A-FC6D-4448-98F9-A0ED21AB2BCD}"/>
+              </a:ext>
+            </a:extLst>
+          </p:cNvPr>
+          <p:cNvSpPr/>
+          <p:nvPr/>
+        </p:nvSpPr>
+        <p:spPr>
+          <a:xfrm rot="10800000">
+            <a:off x="9565238" y="2155825"/>
+            <a:ext cx="602499" cy="178373"/>
+          </a:xfrm>
+          <a:custGeom>
+            <a:avLst/>
+            <a:gdLst>
+              <a:gd name="connsiteX0" fmla="*/ 602499 w 602499"/>
+              <a:gd name="connsiteY0" fmla="*/ 178373 h 178373"/>
+              <a:gd name="connsiteX1" fmla="*/ 301249 w 602499"/>
+              <a:gd name="connsiteY1" fmla="*/ 163509 h 178373"/>
+              <a:gd name="connsiteX2" fmla="*/ 301250 w 602499"/>
+              <a:gd name="connsiteY2" fmla="*/ 103394 h 178373"/>
+              <a:gd name="connsiteX3" fmla="*/ 0 w 602499"/>
+              <a:gd name="connsiteY3" fmla="*/ 88530 h 178373"/>
+              <a:gd name="connsiteX4" fmla="*/ 301250 w 602499"/>
+              <a:gd name="connsiteY4" fmla="*/ 73666 h 178373"/>
+              <a:gd name="connsiteX5" fmla="*/ 301250 w 602499"/>
+              <a:gd name="connsiteY5" fmla="*/ 14864 h 178373"/>
+              <a:gd name="connsiteX6" fmla="*/ 602500 w 602499"/>
+              <a:gd name="connsiteY6" fmla="*/ 0 h 178373"/>
+              <a:gd name="connsiteX7" fmla="*/ 602499 w 602499"/>
+              <a:gd name="connsiteY7" fmla="*/ 178373 h 178373"/>
+              <a:gd name="connsiteX0" fmla="*/ 602499 w 602499"/>
+              <a:gd name="connsiteY0" fmla="*/ 178373 h 178373"/>
+              <a:gd name="connsiteX1" fmla="*/ 301249 w 602499"/>
+              <a:gd name="connsiteY1" fmla="*/ 163509 h 178373"/>
+              <a:gd name="connsiteX2" fmla="*/ 301250 w 602499"/>
+              <a:gd name="connsiteY2" fmla="*/ 103394 h 178373"/>
+              <a:gd name="connsiteX3" fmla="*/ 0 w 602499"/>
+              <a:gd name="connsiteY3" fmla="*/ 88530 h 178373"/>
+              <a:gd name="connsiteX4" fmla="*/ 301250 w 602499"/>
+              <a:gd name="connsiteY4" fmla="*/ 73666 h 178373"/>
+              <a:gd name="connsiteX5" fmla="*/ 301250 w 602499"/>
+              <a:gd name="connsiteY5" fmla="*/ 14864 h 178373"/>
+              <a:gd name="connsiteX6" fmla="*/ 602500 w 602499"/>
+              <a:gd name="connsiteY6" fmla="*/ 0 h 178373"/>
+            </a:gdLst>
+            <a:ahLst/>
+            <a:cxnLst>
+              <a:cxn ang="0">
+                <a:pos x="connsiteX0" y="connsiteY0"/>
+              </a:cxn>
+              <a:cxn ang="0">
+                <a:pos x="connsiteX1" y="connsiteY1"/>
+              </a:cxn>
+              <a:cxn ang="0">
+                <a:pos x="connsiteX2" y="connsiteY2"/>
+              </a:cxn>
+              <a:cxn ang="0">
+                <a:pos x="connsiteX3" y="connsiteY3"/>
+              </a:cxn>
+              <a:cxn ang="0">
+                <a:pos x="connsiteX4" y="connsiteY4"/>
+              </a:cxn>
+              <a:cxn ang="0">
+                <a:pos x="connsiteX5" y="connsiteY5"/>
+              </a:cxn>
+              <a:cxn ang="0">
+                <a:pos x="connsiteX6" y="connsiteY6"/>
+              </a:cxn>
+            </a:cxnLst>
+            <a:rect l="l" t="t" r="r" b="b"/>
+            <a:pathLst>
+              <a:path w="602499" h="178373" stroke="0" extrusionOk="0">
+                <a:moveTo>
+                  <a:pt x="602499" y="178373"/>
+                </a:moveTo>
+                <a:cubicBezTo>
+                  <a:pt x="436240" y="179153"/>
+                  <a:pt x="301139" y="172267"/>
+                  <a:pt x="301249" y="163509"/>
+                </a:cubicBezTo>
+                <a:cubicBezTo>
+                  <a:pt x="299813" y="144590"/>
+                  <a:pt x="301114" y="123006"/>
+                  <a:pt x="301250" y="103394"/>
+                </a:cubicBezTo>
+                <a:cubicBezTo>
+                  <a:pt x="313608" y="87769"/>
+                  <a:pt x="142745" y="77304"/>
+                  <a:pt x="0" y="88530"/>
+                </a:cubicBezTo>
+                <a:cubicBezTo>
+                  <a:pt x="166855" y="89072"/>
+                  <a:pt x="302034" y="82259"/>
+                  <a:pt x="301250" y="73666"/>
+                </a:cubicBezTo>
+                <a:cubicBezTo>
+                  <a:pt x="298187" y="49252"/>
+                  <a:pt x="300544" y="23894"/>
+                  <a:pt x="301250" y="14864"/>
+                </a:cubicBezTo>
+                <a:cubicBezTo>
+                  <a:pt x="280713" y="22812"/>
+                  <a:pt x="438258" y="1784"/>
+                  <a:pt x="602500" y="0"/>
+                </a:cubicBezTo>
+                <a:cubicBezTo>
+                  <a:pt x="600608" y="62017"/>
+                  <a:pt x="608553" y="127426"/>
+                  <a:pt x="602499" y="178373"/>
+                </a:cubicBezTo>
+                <a:close/>
+              </a:path>
+              <a:path w="602499" h="178373" fill="none" extrusionOk="0">
+                <a:moveTo>
+                  <a:pt x="602499" y="178373"/>
+                </a:moveTo>
+                <a:cubicBezTo>
+                  <a:pt x="436404" y="179891"/>
+                  <a:pt x="302003" y="171185"/>
+                  <a:pt x="301249" y="163509"/>
+                </a:cubicBezTo>
+                <a:cubicBezTo>
+                  <a:pt x="303180" y="142471"/>
+                  <a:pt x="300288" y="123544"/>
+                  <a:pt x="301250" y="103394"/>
+                </a:cubicBezTo>
+                <a:cubicBezTo>
+                  <a:pt x="305707" y="99646"/>
+                  <a:pt x="169082" y="85412"/>
+                  <a:pt x="0" y="88530"/>
+                </a:cubicBezTo>
+                <a:cubicBezTo>
+                  <a:pt x="167308" y="88705"/>
+                  <a:pt x="300583" y="82144"/>
+                  <a:pt x="301250" y="73666"/>
+                </a:cubicBezTo>
+                <a:cubicBezTo>
+                  <a:pt x="298798" y="57811"/>
+                  <a:pt x="304272" y="41698"/>
+                  <a:pt x="301250" y="14864"/>
+                </a:cubicBezTo>
+                <a:cubicBezTo>
+                  <a:pt x="284763" y="9954"/>
+                  <a:pt x="446446" y="-21483"/>
+                  <a:pt x="602500" y="0"/>
+                </a:cubicBezTo>
+              </a:path>
+            </a:pathLst>
+          </a:custGeom>
+          <a:ln w="19050">
+            <a:solidFill>
+              <a:schemeClr val="accent4">
+                <a:lumMod val="75000"/>
+              </a:schemeClr>
+            </a:solidFill>
+            <a:extLst>
+              <a:ext uri="{C807C97D-BFC1-408E-A445-0C87EB9F89A2}">
+                <ask:lineSketchStyleProps xmlns:ask="http://schemas.microsoft.com/office/drawing/2018/sketchyshapes" sd="431491757">
+                  <a:prstGeom prst="leftBrace">
+                    <a:avLst>
+                      <a:gd name="adj1" fmla="val 8333"/>
+                      <a:gd name="adj2" fmla="val 49632"/>
+                    </a:avLst>
+                  </a:prstGeom>
+                  <ask:type>
+                    <ask:lineSketchCurved/>
+                  </ask:type>
+                </ask:lineSketchStyleProps>
+              </a:ext>
+            </a:extLst>
+          </a:ln>
+        </p:spPr>
+        <p:style>
+          <a:lnRef idx="1">
+            <a:schemeClr val="accent1"/>
+          </a:lnRef>
+          <a:fillRef idx="0">
+            <a:schemeClr val="accent1"/>
+          </a:fillRef>
+          <a:effectRef idx="0">
+            <a:schemeClr val="accent1"/>
+          </a:effectRef>
+          <a:fontRef idx="minor">
+            <a:schemeClr val="tx1"/>
+          </a:fontRef>
+        </p:style>
+        <p:txBody>
+          <a:bodyPr rtlCol="0" anchor="ctr"/>
+          <a:lstStyle/>
+          <a:p>
+            <a:pPr algn="ctr"/>
+            <a:endParaRPr lang="pl-PL">
+              <a:solidFill>
+                <a:schemeClr val="accent3">
+                  <a:lumMod val="75000"/>
+                </a:schemeClr>
+              </a:solidFill>
+            </a:endParaRPr>
+          </a:p>
+        </p:txBody>
+      </p:sp>
+      <p:sp>
+        <p:nvSpPr>
+          <p:cNvPr id="15" name="Nawias klamrowy otwierający 14">
+            <a:extLst>
+              <a:ext uri="{FF2B5EF4-FFF2-40B4-BE49-F238E27FC236}">
+                <a16:creationId xmlns:a16="http://schemas.microsoft.com/office/drawing/2014/main" id="{C3CD08DA-EFB1-4EBB-8CD0-BFC24BA10AA7}"/>
+              </a:ext>
+            </a:extLst>
+          </p:cNvPr>
+          <p:cNvSpPr/>
+          <p:nvPr/>
+        </p:nvSpPr>
+        <p:spPr>
+          <a:xfrm>
+            <a:off x="3184479" y="3071188"/>
+            <a:ext cx="727881" cy="358027"/>
+          </a:xfrm>
+          <a:custGeom>
+            <a:avLst/>
+            <a:gdLst>
+              <a:gd name="connsiteX0" fmla="*/ 727881 w 727881"/>
+              <a:gd name="connsiteY0" fmla="*/ 358027 h 358027"/>
+              <a:gd name="connsiteX1" fmla="*/ 363940 w 727881"/>
+              <a:gd name="connsiteY1" fmla="*/ 328193 h 358027"/>
+              <a:gd name="connsiteX2" fmla="*/ 363941 w 727881"/>
+              <a:gd name="connsiteY2" fmla="*/ 207530 h 358027"/>
+              <a:gd name="connsiteX3" fmla="*/ 0 w 727881"/>
+              <a:gd name="connsiteY3" fmla="*/ 177696 h 358027"/>
+              <a:gd name="connsiteX4" fmla="*/ 363941 w 727881"/>
+              <a:gd name="connsiteY4" fmla="*/ 147862 h 358027"/>
+              <a:gd name="connsiteX5" fmla="*/ 363941 w 727881"/>
+              <a:gd name="connsiteY5" fmla="*/ 29834 h 358027"/>
+              <a:gd name="connsiteX6" fmla="*/ 727882 w 727881"/>
+              <a:gd name="connsiteY6" fmla="*/ 0 h 358027"/>
+              <a:gd name="connsiteX7" fmla="*/ 727881 w 727881"/>
+              <a:gd name="connsiteY7" fmla="*/ 358027 h 358027"/>
+              <a:gd name="connsiteX0" fmla="*/ 727881 w 727881"/>
+              <a:gd name="connsiteY0" fmla="*/ 358027 h 358027"/>
+              <a:gd name="connsiteX1" fmla="*/ 363940 w 727881"/>
+              <a:gd name="connsiteY1" fmla="*/ 328193 h 358027"/>
+              <a:gd name="connsiteX2" fmla="*/ 363941 w 727881"/>
+              <a:gd name="connsiteY2" fmla="*/ 207530 h 358027"/>
+              <a:gd name="connsiteX3" fmla="*/ 0 w 727881"/>
+              <a:gd name="connsiteY3" fmla="*/ 177696 h 358027"/>
+              <a:gd name="connsiteX4" fmla="*/ 363941 w 727881"/>
+              <a:gd name="connsiteY4" fmla="*/ 147862 h 358027"/>
+              <a:gd name="connsiteX5" fmla="*/ 363941 w 727881"/>
+              <a:gd name="connsiteY5" fmla="*/ 29834 h 358027"/>
+              <a:gd name="connsiteX6" fmla="*/ 727882 w 727881"/>
+              <a:gd name="connsiteY6" fmla="*/ 0 h 358027"/>
+            </a:gdLst>
+            <a:ahLst/>
+            <a:cxnLst>
+              <a:cxn ang="0">
+                <a:pos x="connsiteX0" y="connsiteY0"/>
+              </a:cxn>
+              <a:cxn ang="0">
+                <a:pos x="connsiteX1" y="connsiteY1"/>
+              </a:cxn>
+              <a:cxn ang="0">
+                <a:pos x="connsiteX2" y="connsiteY2"/>
+              </a:cxn>
+              <a:cxn ang="0">
+                <a:pos x="connsiteX3" y="connsiteY3"/>
+              </a:cxn>
+              <a:cxn ang="0">
+                <a:pos x="connsiteX4" y="connsiteY4"/>
+              </a:cxn>
+              <a:cxn ang="0">
+                <a:pos x="connsiteX5" y="connsiteY5"/>
+              </a:cxn>
+              <a:cxn ang="0">
+                <a:pos x="connsiteX6" y="connsiteY6"/>
+              </a:cxn>
+            </a:cxnLst>
+            <a:rect l="l" t="t" r="r" b="b"/>
+            <a:pathLst>
+              <a:path w="727881" h="358027" stroke="0" extrusionOk="0">
+                <a:moveTo>
+                  <a:pt x="727881" y="358027"/>
+                </a:moveTo>
+                <a:cubicBezTo>
+                  <a:pt x="527088" y="359401"/>
+                  <a:pt x="363523" y="346746"/>
+                  <a:pt x="363940" y="328193"/>
+                </a:cubicBezTo>
+                <a:cubicBezTo>
+                  <a:pt x="359746" y="291240"/>
+                  <a:pt x="362897" y="244473"/>
+                  <a:pt x="363941" y="207530"/>
+                </a:cubicBezTo>
+                <a:cubicBezTo>
+                  <a:pt x="369605" y="187654"/>
+                  <a:pt x="190271" y="172599"/>
+                  <a:pt x="0" y="177696"/>
+                </a:cubicBezTo>
+                <a:cubicBezTo>
+                  <a:pt x="203133" y="180110"/>
+                  <a:pt x="366599" y="165640"/>
+                  <a:pt x="363941" y="147862"/>
+                </a:cubicBezTo>
+                <a:cubicBezTo>
+                  <a:pt x="366630" y="95784"/>
+                  <a:pt x="367026" y="88140"/>
+                  <a:pt x="363941" y="29834"/>
+                </a:cubicBezTo>
+                <a:cubicBezTo>
+                  <a:pt x="353190" y="21815"/>
+                  <a:pt x="551201" y="20326"/>
+                  <a:pt x="727882" y="0"/>
+                </a:cubicBezTo>
+                <a:cubicBezTo>
+                  <a:pt x="717293" y="133664"/>
+                  <a:pt x="738376" y="253438"/>
+                  <a:pt x="727881" y="358027"/>
+                </a:cubicBezTo>
+                <a:close/>
+              </a:path>
+              <a:path w="727881" h="358027" fill="none" extrusionOk="0">
+                <a:moveTo>
+                  <a:pt x="727881" y="358027"/>
+                </a:moveTo>
+                <a:cubicBezTo>
+                  <a:pt x="527452" y="361103"/>
+                  <a:pt x="365362" y="343664"/>
+                  <a:pt x="363940" y="328193"/>
+                </a:cubicBezTo>
+                <a:cubicBezTo>
+                  <a:pt x="366792" y="286496"/>
+                  <a:pt x="356954" y="248566"/>
+                  <a:pt x="363941" y="207530"/>
+                </a:cubicBezTo>
+                <a:cubicBezTo>
+                  <a:pt x="378322" y="205446"/>
+                  <a:pt x="206593" y="171248"/>
+                  <a:pt x="0" y="177696"/>
+                </a:cubicBezTo>
+                <a:cubicBezTo>
+                  <a:pt x="202996" y="178072"/>
+                  <a:pt x="362441" y="164944"/>
+                  <a:pt x="363941" y="147862"/>
+                </a:cubicBezTo>
+                <a:cubicBezTo>
+                  <a:pt x="369726" y="114132"/>
+                  <a:pt x="363500" y="80608"/>
+                  <a:pt x="363941" y="29834"/>
+                </a:cubicBezTo>
+                <a:cubicBezTo>
+                  <a:pt x="343792" y="17389"/>
+                  <a:pt x="540970" y="-29320"/>
+                  <a:pt x="727882" y="0"/>
+                </a:cubicBezTo>
+              </a:path>
+            </a:pathLst>
+          </a:custGeom>
+          <a:ln w="19050">
+            <a:solidFill>
+              <a:schemeClr val="accent3">
+                <a:lumMod val="75000"/>
+              </a:schemeClr>
+            </a:solidFill>
+            <a:extLst>
+              <a:ext uri="{C807C97D-BFC1-408E-A445-0C87EB9F89A2}">
+                <ask:lineSketchStyleProps xmlns:ask="http://schemas.microsoft.com/office/drawing/2018/sketchyshapes" sd="431491757">
+                  <a:prstGeom prst="leftBrace">
+                    <a:avLst>
+                      <a:gd name="adj1" fmla="val 8333"/>
+                      <a:gd name="adj2" fmla="val 49632"/>
+                    </a:avLst>
+                  </a:prstGeom>
+                  <ask:type>
+                    <ask:lineSketchCurved/>
+                  </ask:type>
+                </ask:lineSketchStyleProps>
+              </a:ext>
+            </a:extLst>
+          </a:ln>
+        </p:spPr>
+        <p:style>
+          <a:lnRef idx="1">
+            <a:schemeClr val="accent1"/>
+          </a:lnRef>
+          <a:fillRef idx="0">
+            <a:schemeClr val="accent1"/>
+          </a:fillRef>
+          <a:effectRef idx="0">
+            <a:schemeClr val="accent1"/>
+          </a:effectRef>
+          <a:fontRef idx="minor">
+            <a:schemeClr val="tx1"/>
+          </a:fontRef>
+        </p:style>
+        <p:txBody>
+          <a:bodyPr rtlCol="0" anchor="ctr"/>
+          <a:lstStyle/>
+          <a:p>
+            <a:pPr algn="ctr"/>
+            <a:endParaRPr lang="pl-PL">
+              <a:solidFill>
+                <a:schemeClr val="accent3">
+                  <a:lumMod val="75000"/>
+                </a:schemeClr>
+              </a:solidFill>
+            </a:endParaRPr>
+          </a:p>
+        </p:txBody>
+      </p:sp>
+      <p:sp>
+        <p:nvSpPr>
+          <p:cNvPr id="16" name="pole tekstowe 15">
+            <a:extLst>
+              <a:ext uri="{FF2B5EF4-FFF2-40B4-BE49-F238E27FC236}">
+                <a16:creationId xmlns:a16="http://schemas.microsoft.com/office/drawing/2014/main" id="{84137CCC-687F-4013-87AB-86727DF7DCB0}"/>
+              </a:ext>
+            </a:extLst>
+          </p:cNvPr>
+          <p:cNvSpPr txBox="1"/>
+          <p:nvPr/>
+        </p:nvSpPr>
+        <p:spPr>
+          <a:xfrm>
+            <a:off x="644524" y="1870436"/>
+            <a:ext cx="2873375" cy="461665"/>
+          </a:xfrm>
+          <a:prstGeom prst="rect">
+            <a:avLst/>
+          </a:prstGeom>
+          <a:noFill/>
+        </p:spPr>
+        <p:txBody>
+          <a:bodyPr wrap="square" rtlCol="0">
+            <a:spAutoFit/>
+          </a:bodyPr>
+          <a:lstStyle/>
+          <a:p>
+            <a:pPr algn="ctr"/>
+            <a:r>
+              <a:rPr lang="pl-PL" sz="1400" b="1" dirty="0">
+                <a:solidFill>
+                  <a:srgbClr val="92D050"/>
+                </a:solidFill>
+              </a:rPr>
+              <a:t>_id to GUID</a:t>
+            </a:r>
+          </a:p>
+          <a:p>
+            <a:pPr algn="ctr"/>
+            <a:r>
+              <a:rPr lang="pl-PL" sz="1000" dirty="0">
+                <a:solidFill>
+                  <a:srgbClr val="92D050"/>
+                </a:solidFill>
+              </a:rPr>
+              <a:t>{030B4A82-1B7C-11CF-9D53-00AA003C9CB6}</a:t>
+            </a:r>
+            <a:endParaRPr lang="pl-PL" sz="1600" dirty="0">
+              <a:solidFill>
+                <a:srgbClr val="92D050"/>
+              </a:solidFill>
+            </a:endParaRPr>
+          </a:p>
+        </p:txBody>
+      </p:sp>
+      <p:sp>
+        <p:nvSpPr>
+          <p:cNvPr id="17" name="Nawias klamrowy otwierający 16">
+            <a:extLst>
+              <a:ext uri="{FF2B5EF4-FFF2-40B4-BE49-F238E27FC236}">
+                <a16:creationId xmlns:a16="http://schemas.microsoft.com/office/drawing/2014/main" id="{2713E76D-0742-4F2F-BB68-45402DE64CCE}"/>
+              </a:ext>
+            </a:extLst>
+          </p:cNvPr>
+          <p:cNvSpPr/>
+          <p:nvPr/>
+        </p:nvSpPr>
+        <p:spPr>
+          <a:xfrm rot="10800000">
+            <a:off x="8259726" y="1957952"/>
+            <a:ext cx="147849" cy="194979"/>
+          </a:xfrm>
+          <a:custGeom>
+            <a:avLst/>
+            <a:gdLst>
+              <a:gd name="connsiteX0" fmla="*/ 147849 w 147849"/>
+              <a:gd name="connsiteY0" fmla="*/ 194979 h 194979"/>
+              <a:gd name="connsiteX1" fmla="*/ 73924 w 147849"/>
+              <a:gd name="connsiteY1" fmla="*/ 182659 h 194979"/>
+              <a:gd name="connsiteX2" fmla="*/ 73925 w 147849"/>
+              <a:gd name="connsiteY2" fmla="*/ 109092 h 194979"/>
+              <a:gd name="connsiteX3" fmla="*/ 0 w 147849"/>
+              <a:gd name="connsiteY3" fmla="*/ 96772 h 194979"/>
+              <a:gd name="connsiteX4" fmla="*/ 73925 w 147849"/>
+              <a:gd name="connsiteY4" fmla="*/ 84452 h 194979"/>
+              <a:gd name="connsiteX5" fmla="*/ 73925 w 147849"/>
+              <a:gd name="connsiteY5" fmla="*/ 12320 h 194979"/>
+              <a:gd name="connsiteX6" fmla="*/ 147850 w 147849"/>
+              <a:gd name="connsiteY6" fmla="*/ 0 h 194979"/>
+              <a:gd name="connsiteX7" fmla="*/ 147849 w 147849"/>
+              <a:gd name="connsiteY7" fmla="*/ 194979 h 194979"/>
+              <a:gd name="connsiteX0" fmla="*/ 147849 w 147849"/>
+              <a:gd name="connsiteY0" fmla="*/ 194979 h 194979"/>
+              <a:gd name="connsiteX1" fmla="*/ 73924 w 147849"/>
+              <a:gd name="connsiteY1" fmla="*/ 182659 h 194979"/>
+              <a:gd name="connsiteX2" fmla="*/ 73925 w 147849"/>
+              <a:gd name="connsiteY2" fmla="*/ 109092 h 194979"/>
+              <a:gd name="connsiteX3" fmla="*/ 0 w 147849"/>
+              <a:gd name="connsiteY3" fmla="*/ 96772 h 194979"/>
+              <a:gd name="connsiteX4" fmla="*/ 73925 w 147849"/>
+              <a:gd name="connsiteY4" fmla="*/ 84452 h 194979"/>
+              <a:gd name="connsiteX5" fmla="*/ 73925 w 147849"/>
+              <a:gd name="connsiteY5" fmla="*/ 12320 h 194979"/>
+              <a:gd name="connsiteX6" fmla="*/ 147850 w 147849"/>
+              <a:gd name="connsiteY6" fmla="*/ 0 h 194979"/>
+            </a:gdLst>
+            <a:ahLst/>
+            <a:cxnLst>
+              <a:cxn ang="0">
+                <a:pos x="connsiteX0" y="connsiteY0"/>
+              </a:cxn>
+              <a:cxn ang="0">
+                <a:pos x="connsiteX1" y="connsiteY1"/>
+              </a:cxn>
+              <a:cxn ang="0">
+                <a:pos x="connsiteX2" y="connsiteY2"/>
+              </a:cxn>
+              <a:cxn ang="0">
+                <a:pos x="connsiteX3" y="connsiteY3"/>
+              </a:cxn>
+              <a:cxn ang="0">
+                <a:pos x="connsiteX4" y="connsiteY4"/>
+              </a:cxn>
+              <a:cxn ang="0">
+                <a:pos x="connsiteX5" y="connsiteY5"/>
+              </a:cxn>
+              <a:cxn ang="0">
+                <a:pos x="connsiteX6" y="connsiteY6"/>
+              </a:cxn>
+            </a:cxnLst>
+            <a:rect l="l" t="t" r="r" b="b"/>
+            <a:pathLst>
+              <a:path w="147849" h="194979" stroke="0" extrusionOk="0">
+                <a:moveTo>
+                  <a:pt x="147849" y="194979"/>
+                </a:moveTo>
+                <a:cubicBezTo>
+                  <a:pt x="107221" y="196312"/>
+                  <a:pt x="73769" y="190236"/>
+                  <a:pt x="73924" y="182659"/>
+                </a:cubicBezTo>
+                <a:cubicBezTo>
+                  <a:pt x="73170" y="158724"/>
+                  <a:pt x="73087" y="130985"/>
+                  <a:pt x="73925" y="109092"/>
+                </a:cubicBezTo>
+                <a:cubicBezTo>
+                  <a:pt x="75280" y="101475"/>
+                  <a:pt x="39128" y="95964"/>
+                  <a:pt x="0" y="96772"/>
+                </a:cubicBezTo>
+                <a:cubicBezTo>
+                  <a:pt x="40971" y="96934"/>
+                  <a:pt x="74397" y="91487"/>
+                  <a:pt x="73925" y="84452"/>
+                </a:cubicBezTo>
+                <a:cubicBezTo>
+                  <a:pt x="74333" y="64906"/>
+                  <a:pt x="73632" y="45938"/>
+                  <a:pt x="73925" y="12320"/>
+                </a:cubicBezTo>
+                <a:cubicBezTo>
+                  <a:pt x="69264" y="9183"/>
+                  <a:pt x="111510" y="3752"/>
+                  <a:pt x="147850" y="0"/>
+                </a:cubicBezTo>
+                <a:cubicBezTo>
+                  <a:pt x="145276" y="68474"/>
+                  <a:pt x="149308" y="132037"/>
+                  <a:pt x="147849" y="194979"/>
+                </a:cubicBezTo>
+                <a:close/>
+              </a:path>
+              <a:path w="147849" h="194979" fill="none" extrusionOk="0">
+                <a:moveTo>
+                  <a:pt x="147849" y="194979"/>
+                </a:moveTo>
+                <a:cubicBezTo>
+                  <a:pt x="107255" y="196242"/>
+                  <a:pt x="74815" y="188832"/>
+                  <a:pt x="73924" y="182659"/>
+                </a:cubicBezTo>
+                <a:cubicBezTo>
+                  <a:pt x="76501" y="156803"/>
+                  <a:pt x="70709" y="133989"/>
+                  <a:pt x="73925" y="109092"/>
+                </a:cubicBezTo>
+                <a:cubicBezTo>
+                  <a:pt x="75707" y="104072"/>
+                  <a:pt x="43930" y="93196"/>
+                  <a:pt x="0" y="96772"/>
+                </a:cubicBezTo>
+                <a:cubicBezTo>
+                  <a:pt x="41474" y="96894"/>
+                  <a:pt x="73838" y="91291"/>
+                  <a:pt x="73925" y="84452"/>
+                </a:cubicBezTo>
+                <a:cubicBezTo>
+                  <a:pt x="78231" y="69162"/>
+                  <a:pt x="79711" y="24475"/>
+                  <a:pt x="73925" y="12320"/>
+                </a:cubicBezTo>
+                <a:cubicBezTo>
+                  <a:pt x="69039" y="6494"/>
+                  <a:pt x="109234" y="-4603"/>
+                  <a:pt x="147850" y="0"/>
+                </a:cubicBezTo>
+              </a:path>
+            </a:pathLst>
+          </a:custGeom>
+          <a:ln w="19050">
+            <a:solidFill>
+              <a:srgbClr val="92D050"/>
+            </a:solidFill>
+            <a:extLst>
+              <a:ext uri="{C807C97D-BFC1-408E-A445-0C87EB9F89A2}">
+                <ask:lineSketchStyleProps xmlns:ask="http://schemas.microsoft.com/office/drawing/2018/sketchyshapes" sd="431491757">
+                  <a:prstGeom prst="leftBrace">
+                    <a:avLst>
+                      <a:gd name="adj1" fmla="val 8333"/>
+                      <a:gd name="adj2" fmla="val 49632"/>
+                    </a:avLst>
+                  </a:prstGeom>
+                  <ask:type>
+                    <ask:lineSketchCurved/>
+                  </ask:type>
+                </ask:lineSketchStyleProps>
+              </a:ext>
+            </a:extLst>
+          </a:ln>
+        </p:spPr>
+        <p:style>
+          <a:lnRef idx="1">
+            <a:schemeClr val="accent1"/>
+          </a:lnRef>
+          <a:fillRef idx="0">
+            <a:schemeClr val="accent1"/>
+          </a:fillRef>
+          <a:effectRef idx="0">
+            <a:schemeClr val="accent1"/>
+          </a:effectRef>
+          <a:fontRef idx="minor">
+            <a:schemeClr val="tx1"/>
+          </a:fontRef>
+        </p:style>
+        <p:txBody>
+          <a:bodyPr rtlCol="0" anchor="ctr"/>
+          <a:lstStyle/>
+          <a:p>
+            <a:pPr algn="ctr"/>
+            <a:endParaRPr lang="pl-PL" dirty="0">
+              <a:solidFill>
+                <a:schemeClr val="accent3">
+                  <a:lumMod val="75000"/>
+                </a:schemeClr>
+              </a:solidFill>
+            </a:endParaRPr>
+          </a:p>
+        </p:txBody>
+      </p:sp>
     </p:spTree>
     <p:extLst>
       <p:ext uri="{BB962C8B-B14F-4D97-AF65-F5344CB8AC3E}">
@@ -10043,79 +13089,163 @@
           </a:bodyPr>
           <a:lstStyle/>
           <a:p>
-            <a:pPr marL="285750" indent="-285750" algn="just">
+            <a:pPr marL="269875" indent="-269875" algn="just">
               <a:lnSpc>
                 <a:spcPct val="150000"/>
               </a:lnSpc>
               <a:spcAft>
                 <a:spcPts val="1000"/>
               </a:spcAft>
-              <a:buFont typeface="Arial" panose="020B0604020202020204" pitchFamily="34" charset="0"/>
-              <a:buChar char="•"/>
+              <a:buFont typeface="Wingdings" panose="05000000000000000000" pitchFamily="2" charset="2"/>
+              <a:buChar char="q"/>
+              <a:tabLst>
+                <a:tab pos="177800" algn="l"/>
+              </a:tabLst>
             </a:pPr>
             <a:r>
               <a:rPr lang="pl-PL" dirty="0">
                 <a:ea typeface="Calibri" panose="020F0502020204030204" pitchFamily="34" charset="0"/>
                 <a:cs typeface="Times New Roman" panose="02020603050405020304" pitchFamily="18" charset="0"/>
               </a:rPr>
-              <a:t>Użytkownikiem końcowym aplikacji mogą być przedsiębiorstwa zajmujące się transportem kolejowym i przewozem osób.</a:t>
-            </a:r>
-          </a:p>
-          <a:p>
-            <a:pPr marL="285750" indent="-285750" algn="just">
+              <a:t>Użytkownikiem końcowym aplikacji mogą być </a:t>
+            </a:r>
+            <a:r>
+              <a:rPr lang="pl-PL" b="1" dirty="0">
+                <a:solidFill>
+                  <a:schemeClr val="tx2">
+                    <a:lumMod val="50000"/>
+                    <a:lumOff val="50000"/>
+                  </a:schemeClr>
+                </a:solidFill>
+                <a:ea typeface="Calibri" panose="020F0502020204030204" pitchFamily="34" charset="0"/>
+                <a:cs typeface="Times New Roman" panose="02020603050405020304" pitchFamily="18" charset="0"/>
+              </a:rPr>
+              <a:t>przedsiębiorstwa zajmujące się transportem kolejowym i przewozem osób.</a:t>
+            </a:r>
+          </a:p>
+          <a:p>
+            <a:pPr marL="269875" indent="-269875" algn="just">
               <a:lnSpc>
                 <a:spcPct val="150000"/>
               </a:lnSpc>
               <a:spcAft>
                 <a:spcPts val="1000"/>
               </a:spcAft>
-              <a:buFont typeface="Arial" panose="020B0604020202020204" pitchFamily="34" charset="0"/>
-              <a:buChar char="•"/>
+              <a:buFont typeface="Wingdings" panose="05000000000000000000" pitchFamily="2" charset="2"/>
+              <a:buChar char="q"/>
+              <a:tabLst>
+                <a:tab pos="177800" algn="l"/>
+              </a:tabLst>
             </a:pPr>
             <a:r>
               <a:rPr lang="pl-PL" dirty="0">
                 <a:ea typeface="Calibri" panose="020F0502020204030204" pitchFamily="34" charset="0"/>
                 <a:cs typeface="Times New Roman" panose="02020603050405020304" pitchFamily="18" charset="0"/>
               </a:rPr>
-              <a:t>Aplikacja może posłużyć do zbierania danych z tras, celem ich późniejszej analizy, a także tworzenia dokumentacji końcowej dla przewoźników i podsumowywania działalności firmy w danych okrasach czasowych. </a:t>
-            </a:r>
-          </a:p>
-          <a:p>
-            <a:pPr marL="285750" indent="-285750" algn="just">
+              <a:t>Aplikacja może posłużyć do zbierania danych z tras, celem ich późniejszej analizy, a także </a:t>
+            </a:r>
+            <a:r>
+              <a:rPr lang="pl-PL" b="1" dirty="0">
+                <a:solidFill>
+                  <a:schemeClr val="tx2">
+                    <a:lumMod val="50000"/>
+                    <a:lumOff val="50000"/>
+                  </a:schemeClr>
+                </a:solidFill>
+                <a:ea typeface="Calibri" panose="020F0502020204030204" pitchFamily="34" charset="0"/>
+                <a:cs typeface="Times New Roman" panose="02020603050405020304" pitchFamily="18" charset="0"/>
+              </a:rPr>
+              <a:t>tworzenia dokumentacji końcowej dla przewoźników i podsumowywania działalności firmy </a:t>
+            </a:r>
+            <a:r>
+              <a:rPr lang="pl-PL" dirty="0">
+                <a:ea typeface="Calibri" panose="020F0502020204030204" pitchFamily="34" charset="0"/>
+                <a:cs typeface="Times New Roman" panose="02020603050405020304" pitchFamily="18" charset="0"/>
+              </a:rPr>
+              <a:t>w danych okrasach czasowych. </a:t>
+            </a:r>
+          </a:p>
+          <a:p>
+            <a:pPr marL="269875" indent="-269875" algn="just">
               <a:lnSpc>
                 <a:spcPct val="150000"/>
               </a:lnSpc>
               <a:spcAft>
                 <a:spcPts val="1000"/>
               </a:spcAft>
-              <a:buFont typeface="Arial" panose="020B0604020202020204" pitchFamily="34" charset="0"/>
-              <a:buChar char="•"/>
+              <a:buFont typeface="Wingdings" panose="05000000000000000000" pitchFamily="2" charset="2"/>
+              <a:buChar char="q"/>
+              <a:tabLst>
+                <a:tab pos="177800" algn="l"/>
+              </a:tabLst>
             </a:pPr>
             <a:r>
               <a:rPr lang="pl-PL" dirty="0">
                 <a:ea typeface="Calibri" panose="020F0502020204030204" pitchFamily="34" charset="0"/>
                 <a:cs typeface="Times New Roman" panose="02020603050405020304" pitchFamily="18" charset="0"/>
               </a:rPr>
-              <a:t>Dane mogą posłużyć także do optymalizacji tras oraz analizy sytuacji specjalnych np. zmiany napięcia w trakcji kolejowej i analizy przyczyny uszkodzeń taboru.</a:t>
-            </a:r>
-          </a:p>
-          <a:p>
-            <a:pPr marL="285750" indent="-285750" algn="just">
+              <a:t>Dane mogą posłużyć także do </a:t>
+            </a:r>
+            <a:r>
+              <a:rPr lang="pl-PL" b="1" dirty="0">
+                <a:solidFill>
+                  <a:schemeClr val="tx2">
+                    <a:lumMod val="50000"/>
+                    <a:lumOff val="50000"/>
+                  </a:schemeClr>
+                </a:solidFill>
+                <a:ea typeface="Calibri" panose="020F0502020204030204" pitchFamily="34" charset="0"/>
+                <a:cs typeface="Times New Roman" panose="02020603050405020304" pitchFamily="18" charset="0"/>
+              </a:rPr>
+              <a:t>optymalizacji tras oraz analizy sytuacji specjalnych</a:t>
+            </a:r>
+            <a:r>
+              <a:rPr lang="pl-PL" dirty="0">
+                <a:ea typeface="Calibri" panose="020F0502020204030204" pitchFamily="34" charset="0"/>
+                <a:cs typeface="Times New Roman" panose="02020603050405020304" pitchFamily="18" charset="0"/>
+              </a:rPr>
+              <a:t>, np. zmiany napięcia w trakcji kolejowej i analizy przyczyny uszkodzeń taboru.</a:t>
+            </a:r>
+          </a:p>
+          <a:p>
+            <a:pPr marL="269875" indent="-269875" algn="just">
               <a:lnSpc>
                 <a:spcPct val="150000"/>
               </a:lnSpc>
               <a:spcAft>
                 <a:spcPts val="1000"/>
               </a:spcAft>
-              <a:buFont typeface="Arial" panose="020B0604020202020204" pitchFamily="34" charset="0"/>
-              <a:buChar char="•"/>
+              <a:buFont typeface="Wingdings" panose="05000000000000000000" pitchFamily="2" charset="2"/>
+              <a:buChar char="q"/>
+              <a:tabLst>
+                <a:tab pos="177800" algn="l"/>
+              </a:tabLst>
             </a:pPr>
             <a:r>
               <a:rPr lang="pl-PL" dirty="0">
                 <a:ea typeface="Calibri" panose="020F0502020204030204" pitchFamily="34" charset="0"/>
                 <a:cs typeface="Times New Roman" panose="02020603050405020304" pitchFamily="18" charset="0"/>
               </a:rPr>
-              <a:t>Aplikacja w przypadku właściwego wdrożenia na pociągach była by również używana przez maszynistów to kontroli sposobu prowadzenia pociągu, a także mogła by posłużyć jako system ostrzegania np. przed kolizja pociągów.</a:t>
+              <a:t>Aplikacja w przypadku właściwego wdrożenia na pociągach może być używana przez </a:t>
+            </a:r>
+            <a:r>
+              <a:rPr lang="pl-PL" b="1" dirty="0">
+                <a:solidFill>
+                  <a:schemeClr val="accent1">
+                    <a:lumMod val="75000"/>
+                  </a:schemeClr>
+                </a:solidFill>
+                <a:ea typeface="Calibri" panose="020F0502020204030204" pitchFamily="34" charset="0"/>
+                <a:cs typeface="Times New Roman" panose="02020603050405020304" pitchFamily="18" charset="0"/>
+              </a:rPr>
+              <a:t>maszynistów to kontroli sposobu prowadzenia pociągu</a:t>
+            </a:r>
+            <a:r>
+              <a:rPr lang="pl-PL" dirty="0">
+                <a:ea typeface="Calibri" panose="020F0502020204030204" pitchFamily="34" charset="0"/>
+                <a:cs typeface="Times New Roman" panose="02020603050405020304" pitchFamily="18" charset="0"/>
+              </a:rPr>
+              <a:t>, a także jako system ostrzegania np. przed kolizja pociągów.</a:t>
             </a:r>
           </a:p>
         </p:txBody>

</xml_diff>